<commit_message>
Finalização da apresentação - minicurso1
</commit_message>
<xml_diff>
--- a/Introdução ao Desenvolvimento de Front-End com HTMLCSSJS/Apresentacao/apresentacao1.pptx
+++ b/Introdução ao Desenvolvimento de Front-End com HTMLCSSJS/Apresentacao/apresentacao1.pptx
@@ -42,12 +42,13 @@
     <p:sldId id="298" r:id="rId36"/>
     <p:sldId id="299" r:id="rId37"/>
     <p:sldId id="307" r:id="rId38"/>
-    <p:sldId id="258" r:id="rId39"/>
-    <p:sldId id="305" r:id="rId40"/>
-    <p:sldId id="303" r:id="rId41"/>
-    <p:sldId id="304" r:id="rId42"/>
-    <p:sldId id="306" r:id="rId43"/>
-    <p:sldId id="302" r:id="rId44"/>
+    <p:sldId id="308" r:id="rId39"/>
+    <p:sldId id="258" r:id="rId40"/>
+    <p:sldId id="305" r:id="rId41"/>
+    <p:sldId id="303" r:id="rId42"/>
+    <p:sldId id="304" r:id="rId43"/>
+    <p:sldId id="306" r:id="rId44"/>
+    <p:sldId id="302" r:id="rId45"/>
   </p:sldIdLst>
   <p:sldSz cx="12192000" cy="6858000"/>
   <p:notesSz cx="6858000" cy="9144000"/>
@@ -285,7 +286,7 @@
           <a:p>
             <a:fld id="{B2D9E714-A456-4E91-9916-D93F4D97049D}" type="datetimeFigureOut">
               <a:rPr lang="pt-BR" smtClean="0"/>
-              <a:t>16/11/2016</a:t>
+              <a:t>18/11/2016</a:t>
             </a:fld>
             <a:endParaRPr lang="pt-BR"/>
           </a:p>
@@ -455,7 +456,7 @@
           <a:p>
             <a:fld id="{B2D9E714-A456-4E91-9916-D93F4D97049D}" type="datetimeFigureOut">
               <a:rPr lang="pt-BR" smtClean="0"/>
-              <a:t>16/11/2016</a:t>
+              <a:t>18/11/2016</a:t>
             </a:fld>
             <a:endParaRPr lang="pt-BR"/>
           </a:p>
@@ -635,7 +636,7 @@
           <a:p>
             <a:fld id="{B2D9E714-A456-4E91-9916-D93F4D97049D}" type="datetimeFigureOut">
               <a:rPr lang="pt-BR" smtClean="0"/>
-              <a:t>16/11/2016</a:t>
+              <a:t>18/11/2016</a:t>
             </a:fld>
             <a:endParaRPr lang="pt-BR"/>
           </a:p>
@@ -805,7 +806,7 @@
           <a:p>
             <a:fld id="{B2D9E714-A456-4E91-9916-D93F4D97049D}" type="datetimeFigureOut">
               <a:rPr lang="pt-BR" smtClean="0"/>
-              <a:t>16/11/2016</a:t>
+              <a:t>18/11/2016</a:t>
             </a:fld>
             <a:endParaRPr lang="pt-BR"/>
           </a:p>
@@ -1051,7 +1052,7 @@
           <a:p>
             <a:fld id="{B2D9E714-A456-4E91-9916-D93F4D97049D}" type="datetimeFigureOut">
               <a:rPr lang="pt-BR" smtClean="0"/>
-              <a:t>16/11/2016</a:t>
+              <a:t>18/11/2016</a:t>
             </a:fld>
             <a:endParaRPr lang="pt-BR"/>
           </a:p>
@@ -1283,7 +1284,7 @@
           <a:p>
             <a:fld id="{B2D9E714-A456-4E91-9916-D93F4D97049D}" type="datetimeFigureOut">
               <a:rPr lang="pt-BR" smtClean="0"/>
-              <a:t>16/11/2016</a:t>
+              <a:t>18/11/2016</a:t>
             </a:fld>
             <a:endParaRPr lang="pt-BR"/>
           </a:p>
@@ -1650,7 +1651,7 @@
           <a:p>
             <a:fld id="{B2D9E714-A456-4E91-9916-D93F4D97049D}" type="datetimeFigureOut">
               <a:rPr lang="pt-BR" smtClean="0"/>
-              <a:t>16/11/2016</a:t>
+              <a:t>18/11/2016</a:t>
             </a:fld>
             <a:endParaRPr lang="pt-BR"/>
           </a:p>
@@ -1768,7 +1769,7 @@
           <a:p>
             <a:fld id="{B2D9E714-A456-4E91-9916-D93F4D97049D}" type="datetimeFigureOut">
               <a:rPr lang="pt-BR" smtClean="0"/>
-              <a:t>16/11/2016</a:t>
+              <a:t>18/11/2016</a:t>
             </a:fld>
             <a:endParaRPr lang="pt-BR"/>
           </a:p>
@@ -1863,7 +1864,7 @@
           <a:p>
             <a:fld id="{B2D9E714-A456-4E91-9916-D93F4D97049D}" type="datetimeFigureOut">
               <a:rPr lang="pt-BR" smtClean="0"/>
-              <a:t>16/11/2016</a:t>
+              <a:t>18/11/2016</a:t>
             </a:fld>
             <a:endParaRPr lang="pt-BR"/>
           </a:p>
@@ -2140,7 +2141,7 @@
           <a:p>
             <a:fld id="{B2D9E714-A456-4E91-9916-D93F4D97049D}" type="datetimeFigureOut">
               <a:rPr lang="pt-BR" smtClean="0"/>
-              <a:t>16/11/2016</a:t>
+              <a:t>18/11/2016</a:t>
             </a:fld>
             <a:endParaRPr lang="pt-BR"/>
           </a:p>
@@ -2393,7 +2394,7 @@
           <a:p>
             <a:fld id="{B2D9E714-A456-4E91-9916-D93F4D97049D}" type="datetimeFigureOut">
               <a:rPr lang="pt-BR" smtClean="0"/>
-              <a:t>16/11/2016</a:t>
+              <a:t>18/11/2016</a:t>
             </a:fld>
             <a:endParaRPr lang="pt-BR"/>
           </a:p>
@@ -2606,7 +2607,7 @@
           <a:p>
             <a:fld id="{B2D9E714-A456-4E91-9916-D93F4D97049D}" type="datetimeFigureOut">
               <a:rPr lang="pt-BR" smtClean="0"/>
-              <a:t>16/11/2016</a:t>
+              <a:t>18/11/2016</a:t>
             </a:fld>
             <a:endParaRPr lang="pt-BR"/>
           </a:p>
@@ -15671,41 +15672,13 @@
         </p:spPr>
         <p:txBody>
           <a:bodyPr>
-            <a:normAutofit fontScale="85000" lnSpcReduction="20000"/>
+            <a:normAutofit fontScale="92500" lnSpcReduction="20000"/>
           </a:bodyPr>
           <a:lstStyle/>
           <a:p>
             <a:r>
-              <a:rPr lang="pt-BR" b="1" dirty="0" err="1" smtClean="0"/>
-              <a:t>C</a:t>
-            </a:r>
-            <a:r>
-              <a:rPr lang="pt-BR" dirty="0" err="1" smtClean="0"/>
-              <a:t>ascading</a:t>
-            </a:r>
-            <a:r>
               <a:rPr lang="pt-BR" dirty="0" smtClean="0"/>
-              <a:t> </a:t>
-            </a:r>
-            <a:r>
-              <a:rPr lang="pt-BR" b="1" dirty="0" err="1" smtClean="0"/>
-              <a:t>S</a:t>
-            </a:r>
-            <a:r>
-              <a:rPr lang="pt-BR" dirty="0" err="1" smtClean="0"/>
-              <a:t>tyle</a:t>
-            </a:r>
-            <a:r>
-              <a:rPr lang="pt-BR" dirty="0" smtClean="0"/>
-              <a:t> </a:t>
-            </a:r>
-            <a:r>
-              <a:rPr lang="pt-BR" b="1" dirty="0" err="1" smtClean="0"/>
-              <a:t>S</a:t>
-            </a:r>
-            <a:r>
-              <a:rPr lang="pt-BR" dirty="0" err="1" smtClean="0"/>
-              <a:t>heets</a:t>
+              <a:t>Linguagem de programação</a:t>
             </a:r>
             <a:endParaRPr lang="pt-BR" dirty="0" smtClean="0"/>
           </a:p>
@@ -15715,8 +15688,12 @@
               <a:buChar char="o"/>
             </a:pPr>
             <a:r>
-              <a:rPr lang="pt-BR" sz="1800" dirty="0"/>
-              <a:t>Linguagem de folha de estilo.</a:t>
+              <a:rPr lang="pt-BR" sz="1800" dirty="0" smtClean="0"/>
+              <a:t>Interpretada</a:t>
+            </a:r>
+            <a:r>
+              <a:rPr lang="pt-BR" sz="1800" dirty="0" smtClean="0"/>
+              <a:t>.</a:t>
             </a:r>
           </a:p>
           <a:p>
@@ -15725,8 +15702,12 @@
               <a:buChar char="o"/>
             </a:pPr>
             <a:r>
-              <a:rPr lang="pt-BR" sz="1800" dirty="0"/>
-              <a:t>Descreve como os elementos HTML devem ser exibidos na tela.</a:t>
+              <a:rPr lang="pt-BR" sz="1800" dirty="0" smtClean="0"/>
+              <a:t>Suporte para a programação </a:t>
+            </a:r>
+            <a:r>
+              <a:rPr lang="pt-BR" sz="1800" dirty="0" smtClean="0"/>
+              <a:t>Funcional.</a:t>
             </a:r>
           </a:p>
           <a:p>
@@ -15735,49 +15716,99 @@
               <a:buChar char="o"/>
             </a:pPr>
             <a:r>
+              <a:rPr lang="pt-BR" sz="1800" dirty="0" smtClean="0"/>
+              <a:t>Imperativa e Estruturada.</a:t>
+            </a:r>
+            <a:endParaRPr lang="pt-BR" dirty="0"/>
+          </a:p>
+          <a:p>
+            <a:endParaRPr lang="pt-BR" dirty="0" smtClean="0"/>
+          </a:p>
+          <a:p>
+            <a:r>
+              <a:rPr lang="pt-BR" dirty="0"/>
+              <a:t>U</a:t>
+            </a:r>
+            <a:r>
+              <a:rPr lang="pt-BR" dirty="0" smtClean="0"/>
+              <a:t>tilizada </a:t>
+            </a:r>
+            <a:r>
+              <a:rPr lang="pt-BR" dirty="0"/>
+              <a:t>para controlar o HTML e o CSS para manipular comportamentos na página. </a:t>
+            </a:r>
+            <a:endParaRPr lang="pt-BR" dirty="0" smtClean="0"/>
+          </a:p>
+          <a:p>
+            <a:endParaRPr lang="pt-BR" dirty="0"/>
+          </a:p>
+          <a:p>
+            <a:r>
+              <a:rPr lang="pt-BR" dirty="0" smtClean="0"/>
+              <a:t>Criada por Brendan </a:t>
+            </a:r>
+            <a:r>
+              <a:rPr lang="pt-BR" dirty="0" err="1"/>
+              <a:t>Eich</a:t>
+            </a:r>
+            <a:r>
+              <a:rPr lang="pt-BR" dirty="0"/>
+              <a:t> na </a:t>
+            </a:r>
+            <a:r>
+              <a:rPr lang="pt-BR" dirty="0" smtClean="0"/>
+              <a:t>Netscape em 1995.</a:t>
+            </a:r>
+          </a:p>
+          <a:p>
+            <a:pPr lvl="1">
+              <a:buFont typeface="Courier New" panose="02070309020205020404" pitchFamily="49" charset="0"/>
+              <a:buChar char="o"/>
+            </a:pPr>
+            <a:r>
               <a:rPr lang="pt-BR" sz="1800" dirty="0"/>
-              <a:t>Ele pode controlar o layout de várias páginas da web de uma só vez</a:t>
+              <a:t>U</a:t>
+            </a:r>
+            <a:r>
+              <a:rPr lang="pt-BR" sz="1800" dirty="0" smtClean="0"/>
+              <a:t>m </a:t>
+            </a:r>
+            <a:r>
+              <a:rPr lang="pt-BR" sz="1800" dirty="0"/>
+              <a:t>dos precursores dos navegadores </a:t>
+            </a:r>
+            <a:r>
+              <a:rPr lang="pt-BR" sz="1800" dirty="0" smtClean="0"/>
+              <a:t>web</a:t>
             </a:r>
             <a:r>
               <a:rPr lang="pt-BR" sz="1800" dirty="0" smtClean="0"/>
               <a:t>.</a:t>
             </a:r>
+            <a:endParaRPr lang="pt-BR" sz="1800" dirty="0" smtClean="0"/>
           </a:p>
           <a:p>
             <a:endParaRPr lang="pt-BR" dirty="0"/>
           </a:p>
           <a:p>
             <a:r>
+              <a:rPr lang="pt-BR" dirty="0" err="1" smtClean="0"/>
+              <a:t>JavaScript</a:t>
+            </a:r>
+            <a:r>
               <a:rPr lang="pt-BR" dirty="0" smtClean="0"/>
-              <a:t>O HTML descreve o conteúdo de uma página web, a formatação, layout, cores, posicionamento dos elementos são definidos no CSS.</a:t>
-            </a:r>
+              <a:t> é orientada a objetos.</a:t>
+            </a:r>
+            <a:endParaRPr lang="pt-BR" dirty="0" smtClean="0"/>
           </a:p>
           <a:p>
             <a:endParaRPr lang="pt-BR" dirty="0"/>
           </a:p>
           <a:p>
-            <a:r>
-              <a:rPr lang="pt-BR" dirty="0" smtClean="0"/>
-              <a:t>Ocorre separação entre conteúdo e formatação da página.</a:t>
-            </a:r>
-          </a:p>
-          <a:p>
-            <a:endParaRPr lang="pt-BR" dirty="0"/>
-          </a:p>
-          <a:p>
-            <a:r>
-              <a:rPr lang="pt-BR" dirty="0" smtClean="0"/>
-              <a:t>Arquivos HTML tem links para arquivos CSS.</a:t>
-            </a:r>
-          </a:p>
-          <a:p>
-            <a:endParaRPr lang="pt-BR" dirty="0"/>
-          </a:p>
-          <a:p>
-            <a:r>
-              <a:rPr lang="pt-BR" dirty="0" smtClean="0"/>
-              <a:t>Navegadores devem prover suporte para as versões do CSS.</a:t>
-            </a:r>
+            <a:pPr marL="0" indent="0">
+              <a:buNone/>
+            </a:pPr>
+            <a:endParaRPr lang="pt-BR" dirty="0" smtClean="0"/>
           </a:p>
           <a:p>
             <a:pPr lvl="1">
@@ -15881,9 +15912,40 @@
           </a:prstGeom>
         </p:spPr>
       </p:pic>
+      <p:sp>
+        <p:nvSpPr>
+          <p:cNvPr id="8" name="CaixaDeTexto 7"/>
+          <p:cNvSpPr txBox="1"/>
+          <p:nvPr/>
+        </p:nvSpPr>
+        <p:spPr>
+          <a:xfrm>
+            <a:off x="11331224" y="6429423"/>
+            <a:ext cx="838200" cy="369332"/>
+          </a:xfrm>
+          <a:prstGeom prst="rect">
+            <a:avLst/>
+          </a:prstGeom>
+          <a:noFill/>
+        </p:spPr>
+        <p:txBody>
+          <a:bodyPr wrap="square" rtlCol="0">
+            <a:spAutoFit/>
+          </a:bodyPr>
+          <a:lstStyle/>
+          <a:p>
+            <a:pPr algn="ctr"/>
+            <a:r>
+              <a:rPr lang="pt-BR" dirty="0" smtClean="0"/>
+              <a:t>36</a:t>
+            </a:r>
+            <a:endParaRPr lang="pt-BR" dirty="0"/>
+          </a:p>
+        </p:txBody>
+      </p:sp>
       <p:pic>
         <p:nvPicPr>
-          <p:cNvPr id="4" name="Imagem 3"/>
+          <p:cNvPr id="6" name="Imagem 5"/>
           <p:cNvPicPr>
             <a:picLocks noChangeAspect="1"/>
           </p:cNvPicPr>
@@ -15903,45 +15965,14 @@
         </p:blipFill>
         <p:spPr>
           <a:xfrm>
-            <a:off x="9843601" y="4108169"/>
-            <a:ext cx="1798899" cy="1606160"/>
+            <a:off x="8288101" y="4219710"/>
+            <a:ext cx="2329984" cy="2329984"/>
           </a:xfrm>
           <a:prstGeom prst="rect">
             <a:avLst/>
           </a:prstGeom>
         </p:spPr>
       </p:pic>
-      <p:sp>
-        <p:nvSpPr>
-          <p:cNvPr id="8" name="CaixaDeTexto 7"/>
-          <p:cNvSpPr txBox="1"/>
-          <p:nvPr/>
-        </p:nvSpPr>
-        <p:spPr>
-          <a:xfrm>
-            <a:off x="11331224" y="6429423"/>
-            <a:ext cx="838200" cy="369332"/>
-          </a:xfrm>
-          <a:prstGeom prst="rect">
-            <a:avLst/>
-          </a:prstGeom>
-          <a:noFill/>
-        </p:spPr>
-        <p:txBody>
-          <a:bodyPr wrap="square" rtlCol="0">
-            <a:spAutoFit/>
-          </a:bodyPr>
-          <a:lstStyle/>
-          <a:p>
-            <a:pPr algn="ctr"/>
-            <a:r>
-              <a:rPr lang="pt-BR" dirty="0" smtClean="0"/>
-              <a:t>23</a:t>
-            </a:r>
-            <a:endParaRPr lang="pt-BR" dirty="0"/>
-          </a:p>
-        </p:txBody>
-      </p:sp>
     </p:spTree>
     <p:extLst>
       <p:ext uri="{BB962C8B-B14F-4D97-AF65-F5344CB8AC3E}">
@@ -16000,8 +16031,8 @@
           <a:lstStyle/>
           <a:p>
             <a:r>
-              <a:rPr lang="pt-BR" dirty="0" smtClean="0"/>
-              <a:t>Desenvolvimento do Layout</a:t>
+              <a:rPr lang="pt-BR" dirty="0" err="1" smtClean="0"/>
+              <a:t>JavaScript</a:t>
             </a:r>
             <a:endParaRPr lang="pt-BR" dirty="0"/>
           </a:p>
@@ -16024,13 +16055,96 @@
           </a:xfrm>
         </p:spPr>
         <p:txBody>
-          <a:bodyPr/>
-          <a:lstStyle/>
+          <a:bodyPr>
+            <a:normAutofit/>
+          </a:bodyPr>
+          <a:lstStyle/>
+          <a:p>
+            <a:r>
+              <a:rPr lang="pt-BR" dirty="0" err="1" smtClean="0"/>
+              <a:t>JQuery</a:t>
+            </a:r>
+            <a:endParaRPr lang="pt-BR" dirty="0" smtClean="0"/>
+          </a:p>
+          <a:p>
+            <a:pPr lvl="1">
+              <a:buFont typeface="Courier New" panose="02070309020205020404" pitchFamily="49" charset="0"/>
+              <a:buChar char="o"/>
+            </a:pPr>
+            <a:r>
+              <a:rPr lang="pt-BR" sz="1800" dirty="0" smtClean="0"/>
+              <a:t>Biblioteca </a:t>
+            </a:r>
+            <a:r>
+              <a:rPr lang="pt-BR" sz="1800" dirty="0" err="1" smtClean="0"/>
+              <a:t>JavaScript</a:t>
+            </a:r>
+            <a:r>
+              <a:rPr lang="pt-BR" sz="1800" dirty="0" smtClean="0"/>
+              <a:t>.</a:t>
+            </a:r>
+          </a:p>
+          <a:p>
+            <a:pPr marL="0" indent="0">
+              <a:buNone/>
+            </a:pPr>
+            <a:endParaRPr lang="pt-BR" dirty="0" smtClean="0"/>
+          </a:p>
           <a:p>
             <a:r>
               <a:rPr lang="pt-BR" dirty="0" smtClean="0"/>
-              <a:t>Atividade principal</a:t>
-            </a:r>
+              <a:t>Fornece </a:t>
+            </a:r>
+            <a:r>
+              <a:rPr lang="pt-BR" dirty="0"/>
+              <a:t>uma variação dessa linguagem com uma sintaxe mais amigável</a:t>
+            </a:r>
+            <a:r>
+              <a:rPr lang="pt-BR" dirty="0" smtClean="0"/>
+              <a:t>.</a:t>
+            </a:r>
+          </a:p>
+          <a:p>
+            <a:pPr lvl="1">
+              <a:buFont typeface="Courier New" panose="02070309020205020404" pitchFamily="49" charset="0"/>
+              <a:buChar char="o"/>
+            </a:pPr>
+            <a:r>
+              <a:rPr lang="pt-BR" sz="1800" dirty="0" smtClean="0"/>
+              <a:t>Um dos precursores dos navegadores web</a:t>
+            </a:r>
+            <a:r>
+              <a:rPr lang="pt-BR" sz="1800" dirty="0" smtClean="0"/>
+              <a:t>.</a:t>
+            </a:r>
+          </a:p>
+          <a:p>
+            <a:endParaRPr lang="pt-BR" dirty="0"/>
+          </a:p>
+          <a:p>
+            <a:r>
+              <a:rPr lang="pt-BR" dirty="0" smtClean="0"/>
+              <a:t>Atualmente muito popular.</a:t>
+            </a:r>
+            <a:endParaRPr lang="pt-BR" dirty="0" smtClean="0"/>
+          </a:p>
+          <a:p>
+            <a:endParaRPr lang="pt-BR" dirty="0"/>
+          </a:p>
+          <a:p>
+            <a:pPr marL="0" indent="0">
+              <a:buNone/>
+            </a:pPr>
+            <a:endParaRPr lang="pt-BR" dirty="0" smtClean="0"/>
+          </a:p>
+          <a:p>
+            <a:pPr lvl="1">
+              <a:buFont typeface="Courier New" panose="02070309020205020404" pitchFamily="49" charset="0"/>
+              <a:buChar char="o"/>
+            </a:pPr>
+            <a:endParaRPr lang="pt-BR" dirty="0" smtClean="0"/>
+          </a:p>
+          <a:p>
             <a:endParaRPr lang="pt-BR" dirty="0"/>
           </a:p>
         </p:txBody>
@@ -16150,7 +16264,7 @@
             <a:pPr algn="ctr"/>
             <a:r>
               <a:rPr lang="pt-BR" dirty="0" smtClean="0"/>
-              <a:t>36</a:t>
+              <a:t>37</a:t>
             </a:r>
             <a:endParaRPr lang="pt-BR" dirty="0"/>
           </a:p>
@@ -16158,7 +16272,7 @@
       </p:sp>
       <p:pic>
         <p:nvPicPr>
-          <p:cNvPr id="6" name="Imagem 5"/>
+          <p:cNvPr id="4" name="Imagem 3"/>
           <p:cNvPicPr>
             <a:picLocks noChangeAspect="1"/>
           </p:cNvPicPr>
@@ -16178,8 +16292,8 @@
         </p:blipFill>
         <p:spPr>
           <a:xfrm>
-            <a:off x="4571999" y="1968626"/>
-            <a:ext cx="6235521" cy="4645463"/>
+            <a:off x="7862477" y="3902243"/>
+            <a:ext cx="3887847" cy="2332708"/>
           </a:xfrm>
           <a:prstGeom prst="rect">
             <a:avLst/>
@@ -16189,7 +16303,7 @@
     </p:spTree>
     <p:extLst>
       <p:ext uri="{BB962C8B-B14F-4D97-AF65-F5344CB8AC3E}">
-        <p14:creationId xmlns:p14="http://schemas.microsoft.com/office/powerpoint/2010/main" val="1117375188"/>
+        <p14:creationId xmlns:p14="http://schemas.microsoft.com/office/powerpoint/2010/main" val="1503382211"/>
       </p:ext>
     </p:extLst>
   </p:cSld>
@@ -16394,7 +16508,7 @@
             <a:pPr algn="ctr"/>
             <a:r>
               <a:rPr lang="pt-BR" dirty="0" smtClean="0"/>
-              <a:t>36</a:t>
+              <a:t>38</a:t>
             </a:r>
             <a:endParaRPr lang="pt-BR" dirty="0"/>
           </a:p>
@@ -16402,7 +16516,7 @@
       </p:sp>
       <p:pic>
         <p:nvPicPr>
-          <p:cNvPr id="4" name="Imagem 3"/>
+          <p:cNvPr id="6" name="Imagem 5"/>
           <p:cNvPicPr>
             <a:picLocks noChangeAspect="1"/>
           </p:cNvPicPr>
@@ -16422,8 +16536,8 @@
         </p:blipFill>
         <p:spPr>
           <a:xfrm>
-            <a:off x="0" y="0"/>
-            <a:ext cx="12192000" cy="6871545"/>
+            <a:off x="4571999" y="1968626"/>
+            <a:ext cx="6235521" cy="4645463"/>
           </a:xfrm>
           <a:prstGeom prst="rect">
             <a:avLst/>
@@ -16433,7 +16547,7 @@
     </p:spTree>
     <p:extLst>
       <p:ext uri="{BB962C8B-B14F-4D97-AF65-F5344CB8AC3E}">
-        <p14:creationId xmlns:p14="http://schemas.microsoft.com/office/powerpoint/2010/main" val="3831914175"/>
+        <p14:creationId xmlns:p14="http://schemas.microsoft.com/office/powerpoint/2010/main" val="1117375188"/>
       </p:ext>
     </p:extLst>
   </p:cSld>
@@ -16787,7 +16901,7 @@
           <a:p>
             <a:r>
               <a:rPr lang="pt-BR" dirty="0" smtClean="0"/>
-              <a:t>Sistema de Controle de Versão</a:t>
+              <a:t>Desenvolvimento do Layout</a:t>
             </a:r>
             <a:endParaRPr lang="pt-BR" dirty="0"/>
           </a:p>
@@ -16810,125 +16924,14 @@
           </a:xfrm>
         </p:spPr>
         <p:txBody>
-          <a:bodyPr>
-            <a:noAutofit/>
-          </a:bodyPr>
-          <a:lstStyle/>
-          <a:p>
-            <a:r>
-              <a:rPr lang="pt-BR" sz="2200" b="1" dirty="0" err="1" smtClean="0"/>
-              <a:t>Version</a:t>
-            </a:r>
-            <a:r>
-              <a:rPr lang="pt-BR" sz="2200" b="1" dirty="0" smtClean="0"/>
-              <a:t> </a:t>
-            </a:r>
-            <a:r>
-              <a:rPr lang="pt-BR" sz="2200" b="1" dirty="0" err="1" smtClean="0"/>
-              <a:t>Control</a:t>
-            </a:r>
-            <a:r>
-              <a:rPr lang="pt-BR" sz="2200" b="1" dirty="0" smtClean="0"/>
-              <a:t> System (SCM)</a:t>
-            </a:r>
-            <a:endParaRPr lang="pt-BR" sz="2200" dirty="0" smtClean="0"/>
-          </a:p>
-          <a:p>
-            <a:pPr lvl="1">
-              <a:buFont typeface="Courier New" panose="02070309020205020404" pitchFamily="49" charset="0"/>
-              <a:buChar char="o"/>
-            </a:pPr>
-            <a:r>
-              <a:rPr lang="pt-BR" sz="2200" dirty="0" smtClean="0"/>
-              <a:t>Software com finalidade de gerenciar diferentes versões de um arquivo.</a:t>
-            </a:r>
-          </a:p>
-          <a:p>
-            <a:pPr lvl="1">
-              <a:buFont typeface="Courier New" panose="02070309020205020404" pitchFamily="49" charset="0"/>
-              <a:buChar char="o"/>
-            </a:pPr>
-            <a:r>
-              <a:rPr lang="pt-BR" sz="2200" dirty="0" smtClean="0"/>
-              <a:t>Extremamente útil e utilizado no processo de desenvolvimento de softwares.</a:t>
-            </a:r>
-          </a:p>
-          <a:p>
-            <a:pPr lvl="1">
-              <a:buFont typeface="Courier New" panose="02070309020205020404" pitchFamily="49" charset="0"/>
-              <a:buChar char="o"/>
-            </a:pPr>
-            <a:r>
-              <a:rPr lang="pt-BR" sz="2200" dirty="0" smtClean="0"/>
-              <a:t>Guarda o histórico das versões, dos códigos-fontes e documentações.</a:t>
-            </a:r>
-          </a:p>
-          <a:p>
-            <a:pPr lvl="1">
-              <a:buFont typeface="Courier New" panose="02070309020205020404" pitchFamily="49" charset="0"/>
-              <a:buChar char="o"/>
-            </a:pPr>
-            <a:r>
-              <a:rPr lang="pt-BR" sz="2200" dirty="0" smtClean="0"/>
-              <a:t>Permite que diversas pessoas trabalhem simultaneamente no mesmo projeto.</a:t>
-            </a:r>
-            <a:endParaRPr lang="pt-BR" sz="2200" dirty="0"/>
-          </a:p>
-          <a:p>
-            <a:pPr lvl="1">
-              <a:buFont typeface="Courier New" panose="02070309020205020404" pitchFamily="49" charset="0"/>
-              <a:buChar char="o"/>
-            </a:pPr>
-            <a:endParaRPr lang="pt-BR" sz="2200" dirty="0"/>
-          </a:p>
-          <a:p>
-            <a:r>
-              <a:rPr lang="pt-BR" sz="2200" dirty="0" smtClean="0"/>
-              <a:t>Mais conhecidos:</a:t>
-            </a:r>
-          </a:p>
-          <a:p>
-            <a:pPr lvl="1">
-              <a:buFont typeface="Courier New" panose="02070309020205020404" pitchFamily="49" charset="0"/>
-              <a:buChar char="o"/>
-            </a:pPr>
-            <a:r>
-              <a:rPr lang="pt-BR" sz="2200" dirty="0" smtClean="0"/>
-              <a:t>Git, SVN, CVS, Mercurial (Livres)</a:t>
-            </a:r>
-          </a:p>
-          <a:p>
-            <a:pPr lvl="1">
-              <a:buFont typeface="Courier New" panose="02070309020205020404" pitchFamily="49" charset="0"/>
-              <a:buChar char="o"/>
-            </a:pPr>
-            <a:r>
-              <a:rPr lang="pt-BR" sz="2200" dirty="0" smtClean="0"/>
-              <a:t>SourceSafe, TFS, PVCS, </a:t>
-            </a:r>
-            <a:r>
-              <a:rPr lang="pt-BR" sz="2200" dirty="0" err="1" smtClean="0"/>
-              <a:t>ClearCase</a:t>
-            </a:r>
-            <a:r>
-              <a:rPr lang="pt-BR" sz="2200" dirty="0" smtClean="0"/>
-              <a:t> (Comerciais)</a:t>
-            </a:r>
-          </a:p>
-          <a:p>
-            <a:endParaRPr lang="pt-BR" sz="2200" dirty="0"/>
-          </a:p>
-          <a:p>
-            <a:r>
-              <a:rPr lang="pt-BR" sz="2200" dirty="0" smtClean="0"/>
-              <a:t>Muito utilizado para todo tipo de projeto, principalmente software livres</a:t>
-            </a:r>
-          </a:p>
-          <a:p>
-            <a:endParaRPr lang="pt-BR" sz="2200" dirty="0"/>
-          </a:p>
-          <a:p>
-            <a:endParaRPr lang="pt-BR" sz="2200" dirty="0"/>
+          <a:bodyPr/>
+          <a:lstStyle/>
+          <a:p>
+            <a:r>
+              <a:rPr lang="pt-BR" dirty="0" smtClean="0"/>
+              <a:t>Atividade principal</a:t>
+            </a:r>
+            <a:endParaRPr lang="pt-BR" dirty="0"/>
           </a:p>
         </p:txBody>
       </p:sp>
@@ -17024,7 +17027,7 @@
       </p:pic>
       <p:sp>
         <p:nvSpPr>
-          <p:cNvPr id="10" name="CaixaDeTexto 9"/>
+          <p:cNvPr id="8" name="CaixaDeTexto 7"/>
           <p:cNvSpPr txBox="1"/>
           <p:nvPr/>
         </p:nvSpPr>
@@ -17047,7 +17050,7 @@
             <a:pPr algn="ctr"/>
             <a:r>
               <a:rPr lang="pt-BR" dirty="0" smtClean="0"/>
-              <a:t>38</a:t>
+              <a:t>36</a:t>
             </a:r>
             <a:endParaRPr lang="pt-BR" dirty="0"/>
           </a:p>
@@ -17055,7 +17058,7 @@
       </p:sp>
       <p:pic>
         <p:nvPicPr>
-          <p:cNvPr id="11" name="Imagem 10"/>
+          <p:cNvPr id="4" name="Imagem 3"/>
           <p:cNvPicPr>
             <a:picLocks noChangeAspect="1"/>
           </p:cNvPicPr>
@@ -17075,8 +17078,8 @@
         </p:blipFill>
         <p:spPr>
           <a:xfrm>
-            <a:off x="9646277" y="4030561"/>
-            <a:ext cx="2049082" cy="1514539"/>
+            <a:off x="0" y="0"/>
+            <a:ext cx="12192000" cy="6871545"/>
           </a:xfrm>
           <a:prstGeom prst="rect">
             <a:avLst/>
@@ -17086,7 +17089,7 @@
     </p:spTree>
     <p:extLst>
       <p:ext uri="{BB962C8B-B14F-4D97-AF65-F5344CB8AC3E}">
-        <p14:creationId xmlns:p14="http://schemas.microsoft.com/office/powerpoint/2010/main" val="914133805"/>
+        <p14:creationId xmlns:p14="http://schemas.microsoft.com/office/powerpoint/2010/main" val="3831914175"/>
       </p:ext>
     </p:extLst>
   </p:cSld>
@@ -17170,6 +17173,116 @@
           </a:bodyPr>
           <a:lstStyle/>
           <a:p>
+            <a:r>
+              <a:rPr lang="pt-BR" sz="2200" b="1" dirty="0" err="1" smtClean="0"/>
+              <a:t>Version</a:t>
+            </a:r>
+            <a:r>
+              <a:rPr lang="pt-BR" sz="2200" b="1" dirty="0" smtClean="0"/>
+              <a:t> </a:t>
+            </a:r>
+            <a:r>
+              <a:rPr lang="pt-BR" sz="2200" b="1" dirty="0" err="1" smtClean="0"/>
+              <a:t>Control</a:t>
+            </a:r>
+            <a:r>
+              <a:rPr lang="pt-BR" sz="2200" b="1" dirty="0" smtClean="0"/>
+              <a:t> System (SCM)</a:t>
+            </a:r>
+            <a:endParaRPr lang="pt-BR" sz="2200" dirty="0" smtClean="0"/>
+          </a:p>
+          <a:p>
+            <a:pPr lvl="1">
+              <a:buFont typeface="Courier New" panose="02070309020205020404" pitchFamily="49" charset="0"/>
+              <a:buChar char="o"/>
+            </a:pPr>
+            <a:r>
+              <a:rPr lang="pt-BR" sz="2200" dirty="0" smtClean="0"/>
+              <a:t>Software com finalidade de gerenciar diferentes versões de um arquivo.</a:t>
+            </a:r>
+          </a:p>
+          <a:p>
+            <a:pPr lvl="1">
+              <a:buFont typeface="Courier New" panose="02070309020205020404" pitchFamily="49" charset="0"/>
+              <a:buChar char="o"/>
+            </a:pPr>
+            <a:r>
+              <a:rPr lang="pt-BR" sz="2200" dirty="0" smtClean="0"/>
+              <a:t>Extremamente útil e utilizado no processo de desenvolvimento de softwares.</a:t>
+            </a:r>
+          </a:p>
+          <a:p>
+            <a:pPr lvl="1">
+              <a:buFont typeface="Courier New" panose="02070309020205020404" pitchFamily="49" charset="0"/>
+              <a:buChar char="o"/>
+            </a:pPr>
+            <a:r>
+              <a:rPr lang="pt-BR" sz="2200" dirty="0" smtClean="0"/>
+              <a:t>Guarda o histórico das versões, dos códigos-fontes e documentações.</a:t>
+            </a:r>
+          </a:p>
+          <a:p>
+            <a:pPr lvl="1">
+              <a:buFont typeface="Courier New" panose="02070309020205020404" pitchFamily="49" charset="0"/>
+              <a:buChar char="o"/>
+            </a:pPr>
+            <a:r>
+              <a:rPr lang="pt-BR" sz="2200" dirty="0" smtClean="0"/>
+              <a:t>Permite que diversas pessoas trabalhem simultaneamente no mesmo projeto.</a:t>
+            </a:r>
+            <a:endParaRPr lang="pt-BR" sz="2200" dirty="0"/>
+          </a:p>
+          <a:p>
+            <a:pPr lvl="1">
+              <a:buFont typeface="Courier New" panose="02070309020205020404" pitchFamily="49" charset="0"/>
+              <a:buChar char="o"/>
+            </a:pPr>
+            <a:endParaRPr lang="pt-BR" sz="2200" dirty="0"/>
+          </a:p>
+          <a:p>
+            <a:r>
+              <a:rPr lang="pt-BR" sz="2200" dirty="0" smtClean="0"/>
+              <a:t>Mais conhecidos:</a:t>
+            </a:r>
+          </a:p>
+          <a:p>
+            <a:pPr lvl="1">
+              <a:buFont typeface="Courier New" panose="02070309020205020404" pitchFamily="49" charset="0"/>
+              <a:buChar char="o"/>
+            </a:pPr>
+            <a:r>
+              <a:rPr lang="pt-BR" sz="2200" dirty="0" smtClean="0"/>
+              <a:t>Git, SVN, CVS, Mercurial (Livres)</a:t>
+            </a:r>
+          </a:p>
+          <a:p>
+            <a:pPr lvl="1">
+              <a:buFont typeface="Courier New" panose="02070309020205020404" pitchFamily="49" charset="0"/>
+              <a:buChar char="o"/>
+            </a:pPr>
+            <a:r>
+              <a:rPr lang="pt-BR" sz="2200" dirty="0" smtClean="0"/>
+              <a:t>SourceSafe, TFS, PVCS, </a:t>
+            </a:r>
+            <a:r>
+              <a:rPr lang="pt-BR" sz="2200" dirty="0" err="1" smtClean="0"/>
+              <a:t>ClearCase</a:t>
+            </a:r>
+            <a:r>
+              <a:rPr lang="pt-BR" sz="2200" dirty="0" smtClean="0"/>
+              <a:t> (Comerciais)</a:t>
+            </a:r>
+          </a:p>
+          <a:p>
+            <a:endParaRPr lang="pt-BR" sz="2200" dirty="0"/>
+          </a:p>
+          <a:p>
+            <a:r>
+              <a:rPr lang="pt-BR" sz="2200" dirty="0" smtClean="0"/>
+              <a:t>Muito utilizado para todo tipo de projeto, principalmente software livres</a:t>
+            </a:r>
+          </a:p>
+          <a:p>
             <a:endParaRPr lang="pt-BR" sz="2200" dirty="0"/>
           </a:p>
           <a:p>
@@ -17300,7 +17413,7 @@
       </p:sp>
       <p:pic>
         <p:nvPicPr>
-          <p:cNvPr id="4" name="Imagem 3"/>
+          <p:cNvPr id="11" name="Imagem 10"/>
           <p:cNvPicPr>
             <a:picLocks noChangeAspect="1"/>
           </p:cNvPicPr>
@@ -17320,8 +17433,8 @@
         </p:blipFill>
         <p:spPr>
           <a:xfrm>
-            <a:off x="3193960" y="2532149"/>
-            <a:ext cx="5947854" cy="2807387"/>
+            <a:off x="9646277" y="4030561"/>
+            <a:ext cx="2049082" cy="1514539"/>
           </a:xfrm>
           <a:prstGeom prst="rect">
             <a:avLst/>
@@ -17331,7 +17444,7 @@
     </p:spTree>
     <p:extLst>
       <p:ext uri="{BB962C8B-B14F-4D97-AF65-F5344CB8AC3E}">
-        <p14:creationId xmlns:p14="http://schemas.microsoft.com/office/powerpoint/2010/main" val="4254529269"/>
+        <p14:creationId xmlns:p14="http://schemas.microsoft.com/office/powerpoint/2010/main" val="914133805"/>
       </p:ext>
     </p:extLst>
   </p:cSld>
@@ -17387,7 +17500,7 @@
           <a:p>
             <a:r>
               <a:rPr lang="pt-BR" dirty="0" smtClean="0"/>
-              <a:t>Obrigado!</a:t>
+              <a:t>Sistema de Controle de Versão</a:t>
             </a:r>
             <a:endParaRPr lang="pt-BR" dirty="0"/>
           </a:p>
@@ -17543,1022 +17656,40 @@
           </a:p>
         </p:txBody>
       </p:sp>
-      <p:sp>
-        <p:nvSpPr>
-          <p:cNvPr id="6" name="Pizza 5"/>
-          <p:cNvSpPr/>
-          <p:nvPr/>
-        </p:nvSpPr>
-        <p:spPr>
-          <a:xfrm rot="3063928">
-            <a:off x="2756079" y="3065172"/>
-            <a:ext cx="1738648" cy="1661374"/>
-          </a:xfrm>
-          <a:prstGeom prst="pie">
-            <a:avLst/>
-          </a:prstGeom>
-          <a:solidFill>
-            <a:srgbClr val="FFFF00"/>
-          </a:solidFill>
-          <a:ln>
-            <a:solidFill>
-              <a:schemeClr val="tx1"/>
-            </a:solidFill>
-          </a:ln>
-        </p:spPr>
-        <p:style>
-          <a:lnRef idx="2">
-            <a:schemeClr val="accent1">
-              <a:shade val="50000"/>
-            </a:schemeClr>
-          </a:lnRef>
-          <a:fillRef idx="1">
-            <a:schemeClr val="accent1"/>
-          </a:fillRef>
-          <a:effectRef idx="0">
-            <a:schemeClr val="accent1"/>
-          </a:effectRef>
-          <a:fontRef idx="minor">
-            <a:schemeClr val="lt1"/>
-          </a:fontRef>
-        </p:style>
-        <p:txBody>
-          <a:bodyPr rtlCol="0" anchor="ctr"/>
-          <a:lstStyle/>
-          <a:p>
-            <a:pPr algn="ctr"/>
-            <a:endParaRPr lang="pt-BR">
-              <a:solidFill>
-                <a:schemeClr val="tx1"/>
-              </a:solidFill>
-            </a:endParaRPr>
-          </a:p>
-        </p:txBody>
-      </p:sp>
-      <p:sp>
-        <p:nvSpPr>
-          <p:cNvPr id="8" name="Fluxograma: Conector 7"/>
-          <p:cNvSpPr/>
-          <p:nvPr/>
-        </p:nvSpPr>
-        <p:spPr>
-          <a:xfrm>
-            <a:off x="3412901" y="3348507"/>
-            <a:ext cx="257578" cy="257578"/>
-          </a:xfrm>
-          <a:prstGeom prst="flowChartConnector">
-            <a:avLst/>
-          </a:prstGeom>
-          <a:solidFill>
-            <a:schemeClr val="tx1"/>
-          </a:solidFill>
-          <a:ln>
-            <a:solidFill>
-              <a:schemeClr val="tx1"/>
-            </a:solidFill>
-          </a:ln>
-        </p:spPr>
-        <p:style>
-          <a:lnRef idx="2">
-            <a:schemeClr val="accent1">
-              <a:shade val="50000"/>
-            </a:schemeClr>
-          </a:lnRef>
-          <a:fillRef idx="1">
-            <a:schemeClr val="accent1"/>
-          </a:fillRef>
-          <a:effectRef idx="0">
-            <a:schemeClr val="accent1"/>
-          </a:effectRef>
-          <a:fontRef idx="minor">
-            <a:schemeClr val="lt1"/>
-          </a:fontRef>
-        </p:style>
-        <p:txBody>
-          <a:bodyPr rtlCol="0" anchor="ctr"/>
-          <a:lstStyle/>
-          <a:p>
-            <a:pPr algn="ctr"/>
-            <a:endParaRPr lang="pt-BR"/>
-          </a:p>
-        </p:txBody>
-      </p:sp>
-      <p:sp>
-        <p:nvSpPr>
-          <p:cNvPr id="11" name="Fluxograma: Conector 10"/>
-          <p:cNvSpPr/>
-          <p:nvPr/>
-        </p:nvSpPr>
-        <p:spPr>
-          <a:xfrm>
-            <a:off x="4377846" y="3817019"/>
-            <a:ext cx="257578" cy="257578"/>
-          </a:xfrm>
-          <a:prstGeom prst="flowChartConnector">
-            <a:avLst/>
-          </a:prstGeom>
-          <a:solidFill>
-            <a:srgbClr val="FFFF00"/>
-          </a:solidFill>
-          <a:ln>
-            <a:solidFill>
-              <a:schemeClr val="tx1"/>
-            </a:solidFill>
-          </a:ln>
-        </p:spPr>
-        <p:style>
-          <a:lnRef idx="2">
-            <a:schemeClr val="accent1">
-              <a:shade val="50000"/>
-            </a:schemeClr>
-          </a:lnRef>
-          <a:fillRef idx="1">
-            <a:schemeClr val="accent1"/>
-          </a:fillRef>
-          <a:effectRef idx="0">
-            <a:schemeClr val="accent1"/>
-          </a:effectRef>
-          <a:fontRef idx="minor">
-            <a:schemeClr val="lt1"/>
-          </a:fontRef>
-        </p:style>
-        <p:txBody>
-          <a:bodyPr rtlCol="0" anchor="ctr"/>
-          <a:lstStyle/>
-          <a:p>
-            <a:pPr algn="ctr"/>
-            <a:endParaRPr lang="pt-BR"/>
-          </a:p>
-        </p:txBody>
-      </p:sp>
-      <p:sp>
-        <p:nvSpPr>
-          <p:cNvPr id="12" name="Fluxograma: Conector 11"/>
-          <p:cNvSpPr/>
-          <p:nvPr/>
-        </p:nvSpPr>
-        <p:spPr>
-          <a:xfrm>
-            <a:off x="4878324" y="3817019"/>
-            <a:ext cx="257578" cy="257578"/>
-          </a:xfrm>
-          <a:prstGeom prst="flowChartConnector">
-            <a:avLst/>
-          </a:prstGeom>
-          <a:solidFill>
-            <a:srgbClr val="FFFF00"/>
-          </a:solidFill>
-          <a:ln>
-            <a:solidFill>
-              <a:schemeClr val="tx1"/>
-            </a:solidFill>
-          </a:ln>
-        </p:spPr>
-        <p:style>
-          <a:lnRef idx="2">
-            <a:schemeClr val="accent1">
-              <a:shade val="50000"/>
-            </a:schemeClr>
-          </a:lnRef>
-          <a:fillRef idx="1">
-            <a:schemeClr val="accent1"/>
-          </a:fillRef>
-          <a:effectRef idx="0">
-            <a:schemeClr val="accent1"/>
-          </a:effectRef>
-          <a:fontRef idx="minor">
-            <a:schemeClr val="lt1"/>
-          </a:fontRef>
-        </p:style>
-        <p:txBody>
-          <a:bodyPr rtlCol="0" anchor="ctr"/>
-          <a:lstStyle/>
-          <a:p>
-            <a:pPr algn="ctr"/>
-            <a:endParaRPr lang="pt-BR"/>
-          </a:p>
-        </p:txBody>
-      </p:sp>
-      <p:sp>
-        <p:nvSpPr>
-          <p:cNvPr id="13" name="Fluxograma: Conector 12"/>
-          <p:cNvSpPr/>
-          <p:nvPr/>
-        </p:nvSpPr>
-        <p:spPr>
-          <a:xfrm>
-            <a:off x="5405217" y="3817019"/>
-            <a:ext cx="257578" cy="257578"/>
-          </a:xfrm>
-          <a:prstGeom prst="flowChartConnector">
-            <a:avLst/>
-          </a:prstGeom>
-          <a:solidFill>
-            <a:srgbClr val="FFFF00"/>
-          </a:solidFill>
-          <a:ln>
-            <a:solidFill>
-              <a:schemeClr val="tx1"/>
-            </a:solidFill>
-          </a:ln>
-        </p:spPr>
-        <p:style>
-          <a:lnRef idx="2">
-            <a:schemeClr val="accent1">
-              <a:shade val="50000"/>
-            </a:schemeClr>
-          </a:lnRef>
-          <a:fillRef idx="1">
-            <a:schemeClr val="accent1"/>
-          </a:fillRef>
-          <a:effectRef idx="0">
-            <a:schemeClr val="accent1"/>
-          </a:effectRef>
-          <a:fontRef idx="minor">
-            <a:schemeClr val="lt1"/>
-          </a:fontRef>
-        </p:style>
-        <p:txBody>
-          <a:bodyPr rtlCol="0" anchor="ctr"/>
-          <a:lstStyle/>
-          <a:p>
-            <a:pPr algn="ctr"/>
-            <a:endParaRPr lang="pt-BR"/>
-          </a:p>
-        </p:txBody>
-      </p:sp>
-      <p:sp>
-        <p:nvSpPr>
-          <p:cNvPr id="14" name="Fluxograma: Conector 13"/>
-          <p:cNvSpPr/>
-          <p:nvPr/>
-        </p:nvSpPr>
-        <p:spPr>
-          <a:xfrm>
-            <a:off x="5932110" y="3821022"/>
-            <a:ext cx="257578" cy="257578"/>
-          </a:xfrm>
-          <a:prstGeom prst="flowChartConnector">
-            <a:avLst/>
-          </a:prstGeom>
-          <a:solidFill>
-            <a:srgbClr val="FFFF00"/>
-          </a:solidFill>
-          <a:ln>
-            <a:solidFill>
-              <a:schemeClr val="tx1"/>
-            </a:solidFill>
-          </a:ln>
-        </p:spPr>
-        <p:style>
-          <a:lnRef idx="2">
-            <a:schemeClr val="accent1">
-              <a:shade val="50000"/>
-            </a:schemeClr>
-          </a:lnRef>
-          <a:fillRef idx="1">
-            <a:schemeClr val="accent1"/>
-          </a:fillRef>
-          <a:effectRef idx="0">
-            <a:schemeClr val="accent1"/>
-          </a:effectRef>
-          <a:fontRef idx="minor">
-            <a:schemeClr val="lt1"/>
-          </a:fontRef>
-        </p:style>
-        <p:txBody>
-          <a:bodyPr rtlCol="0" anchor="ctr"/>
-          <a:lstStyle/>
-          <a:p>
-            <a:pPr algn="ctr"/>
-            <a:endParaRPr lang="pt-BR"/>
-          </a:p>
-        </p:txBody>
-      </p:sp>
-      <p:sp>
-        <p:nvSpPr>
-          <p:cNvPr id="15" name="Fluxograma: Conector 14"/>
-          <p:cNvSpPr/>
-          <p:nvPr/>
-        </p:nvSpPr>
-        <p:spPr>
-          <a:xfrm>
-            <a:off x="6459003" y="3813016"/>
-            <a:ext cx="257578" cy="257578"/>
-          </a:xfrm>
-          <a:prstGeom prst="flowChartConnector">
-            <a:avLst/>
-          </a:prstGeom>
-          <a:solidFill>
-            <a:srgbClr val="FFFF00"/>
-          </a:solidFill>
-          <a:ln>
-            <a:solidFill>
-              <a:schemeClr val="tx1"/>
-            </a:solidFill>
-          </a:ln>
-        </p:spPr>
-        <p:style>
-          <a:lnRef idx="2">
-            <a:schemeClr val="accent1">
-              <a:shade val="50000"/>
-            </a:schemeClr>
-          </a:lnRef>
-          <a:fillRef idx="1">
-            <a:schemeClr val="accent1"/>
-          </a:fillRef>
-          <a:effectRef idx="0">
-            <a:schemeClr val="accent1"/>
-          </a:effectRef>
-          <a:fontRef idx="minor">
-            <a:schemeClr val="lt1"/>
-          </a:fontRef>
-        </p:style>
-        <p:txBody>
-          <a:bodyPr rtlCol="0" anchor="ctr"/>
-          <a:lstStyle/>
-          <a:p>
-            <a:pPr algn="ctr"/>
-            <a:endParaRPr lang="pt-BR"/>
-          </a:p>
-        </p:txBody>
-      </p:sp>
-      <p:sp>
-        <p:nvSpPr>
-          <p:cNvPr id="16" name="Fluxograma: Conector 15"/>
-          <p:cNvSpPr/>
-          <p:nvPr/>
-        </p:nvSpPr>
-        <p:spPr>
-          <a:xfrm>
-            <a:off x="6959481" y="3813016"/>
-            <a:ext cx="257578" cy="257578"/>
-          </a:xfrm>
-          <a:prstGeom prst="flowChartConnector">
-            <a:avLst/>
-          </a:prstGeom>
-          <a:solidFill>
-            <a:srgbClr val="FFFF00"/>
-          </a:solidFill>
-          <a:ln>
-            <a:solidFill>
-              <a:schemeClr val="tx1"/>
-            </a:solidFill>
-          </a:ln>
-        </p:spPr>
-        <p:style>
-          <a:lnRef idx="2">
-            <a:schemeClr val="accent1">
-              <a:shade val="50000"/>
-            </a:schemeClr>
-          </a:lnRef>
-          <a:fillRef idx="1">
-            <a:schemeClr val="accent1"/>
-          </a:fillRef>
-          <a:effectRef idx="0">
-            <a:schemeClr val="accent1"/>
-          </a:effectRef>
-          <a:fontRef idx="minor">
-            <a:schemeClr val="lt1"/>
-          </a:fontRef>
-        </p:style>
-        <p:txBody>
-          <a:bodyPr rtlCol="0" anchor="ctr"/>
-          <a:lstStyle/>
-          <a:p>
-            <a:pPr algn="ctr"/>
-            <a:endParaRPr lang="pt-BR"/>
-          </a:p>
-        </p:txBody>
-      </p:sp>
-      <p:sp>
-        <p:nvSpPr>
-          <p:cNvPr id="17" name="Fluxograma: Conector 16"/>
-          <p:cNvSpPr/>
-          <p:nvPr/>
-        </p:nvSpPr>
-        <p:spPr>
-          <a:xfrm>
-            <a:off x="7486374" y="3813016"/>
-            <a:ext cx="257578" cy="257578"/>
-          </a:xfrm>
-          <a:prstGeom prst="flowChartConnector">
-            <a:avLst/>
-          </a:prstGeom>
-          <a:solidFill>
-            <a:srgbClr val="FFFF00"/>
-          </a:solidFill>
-          <a:ln>
-            <a:solidFill>
-              <a:schemeClr val="tx1"/>
-            </a:solidFill>
-          </a:ln>
-        </p:spPr>
-        <p:style>
-          <a:lnRef idx="2">
-            <a:schemeClr val="accent1">
-              <a:shade val="50000"/>
-            </a:schemeClr>
-          </a:lnRef>
-          <a:fillRef idx="1">
-            <a:schemeClr val="accent1"/>
-          </a:fillRef>
-          <a:effectRef idx="0">
-            <a:schemeClr val="accent1"/>
-          </a:effectRef>
-          <a:fontRef idx="minor">
-            <a:schemeClr val="lt1"/>
-          </a:fontRef>
-        </p:style>
-        <p:txBody>
-          <a:bodyPr rtlCol="0" anchor="ctr"/>
-          <a:lstStyle/>
-          <a:p>
-            <a:pPr algn="ctr"/>
-            <a:endParaRPr lang="pt-BR"/>
-          </a:p>
-        </p:txBody>
-      </p:sp>
-      <p:sp>
-        <p:nvSpPr>
-          <p:cNvPr id="18" name="Fluxograma: Conector 17"/>
-          <p:cNvSpPr/>
-          <p:nvPr/>
-        </p:nvSpPr>
-        <p:spPr>
-          <a:xfrm>
-            <a:off x="8013267" y="3817019"/>
-            <a:ext cx="257578" cy="257578"/>
-          </a:xfrm>
-          <a:prstGeom prst="flowChartConnector">
-            <a:avLst/>
-          </a:prstGeom>
-          <a:solidFill>
-            <a:srgbClr val="FFFF00"/>
-          </a:solidFill>
-          <a:ln>
-            <a:solidFill>
-              <a:schemeClr val="tx1"/>
-            </a:solidFill>
-          </a:ln>
-        </p:spPr>
-        <p:style>
-          <a:lnRef idx="2">
-            <a:schemeClr val="accent1">
-              <a:shade val="50000"/>
-            </a:schemeClr>
-          </a:lnRef>
-          <a:fillRef idx="1">
-            <a:schemeClr val="accent1"/>
-          </a:fillRef>
-          <a:effectRef idx="0">
-            <a:schemeClr val="accent1"/>
-          </a:effectRef>
-          <a:fontRef idx="minor">
-            <a:schemeClr val="lt1"/>
-          </a:fontRef>
-        </p:style>
-        <p:txBody>
-          <a:bodyPr rtlCol="0" anchor="ctr"/>
-          <a:lstStyle/>
-          <a:p>
-            <a:pPr algn="ctr"/>
-            <a:endParaRPr lang="pt-BR"/>
-          </a:p>
-        </p:txBody>
-      </p:sp>
-      <p:sp>
-        <p:nvSpPr>
-          <p:cNvPr id="19" name="Fluxograma: Conector 18"/>
-          <p:cNvSpPr/>
-          <p:nvPr/>
-        </p:nvSpPr>
-        <p:spPr>
-          <a:xfrm>
-            <a:off x="8535110" y="3838741"/>
-            <a:ext cx="257578" cy="257578"/>
-          </a:xfrm>
-          <a:prstGeom prst="flowChartConnector">
-            <a:avLst/>
-          </a:prstGeom>
-          <a:solidFill>
-            <a:srgbClr val="FFFF00"/>
-          </a:solidFill>
-          <a:ln>
-            <a:solidFill>
-              <a:schemeClr val="tx1"/>
-            </a:solidFill>
-          </a:ln>
-        </p:spPr>
-        <p:style>
-          <a:lnRef idx="2">
-            <a:schemeClr val="accent1">
-              <a:shade val="50000"/>
-            </a:schemeClr>
-          </a:lnRef>
-          <a:fillRef idx="1">
-            <a:schemeClr val="accent1"/>
-          </a:fillRef>
-          <a:effectRef idx="0">
-            <a:schemeClr val="accent1"/>
-          </a:effectRef>
-          <a:fontRef idx="minor">
-            <a:schemeClr val="lt1"/>
-          </a:fontRef>
-        </p:style>
-        <p:txBody>
-          <a:bodyPr rtlCol="0" anchor="ctr"/>
-          <a:lstStyle/>
-          <a:p>
-            <a:pPr algn="ctr"/>
-            <a:endParaRPr lang="pt-BR"/>
-          </a:p>
-        </p:txBody>
-      </p:sp>
-      <p:sp>
-        <p:nvSpPr>
-          <p:cNvPr id="20" name="Fluxograma: Conector 19"/>
-          <p:cNvSpPr/>
-          <p:nvPr/>
-        </p:nvSpPr>
-        <p:spPr>
-          <a:xfrm>
-            <a:off x="9035588" y="3838741"/>
-            <a:ext cx="257578" cy="257578"/>
-          </a:xfrm>
-          <a:prstGeom prst="flowChartConnector">
-            <a:avLst/>
-          </a:prstGeom>
-          <a:solidFill>
-            <a:srgbClr val="FFFF00"/>
-          </a:solidFill>
-          <a:ln>
-            <a:solidFill>
-              <a:schemeClr val="tx1"/>
-            </a:solidFill>
-          </a:ln>
-        </p:spPr>
-        <p:style>
-          <a:lnRef idx="2">
-            <a:schemeClr val="accent1">
-              <a:shade val="50000"/>
-            </a:schemeClr>
-          </a:lnRef>
-          <a:fillRef idx="1">
-            <a:schemeClr val="accent1"/>
-          </a:fillRef>
-          <a:effectRef idx="0">
-            <a:schemeClr val="accent1"/>
-          </a:effectRef>
-          <a:fontRef idx="minor">
-            <a:schemeClr val="lt1"/>
-          </a:fontRef>
-        </p:style>
-        <p:txBody>
-          <a:bodyPr rtlCol="0" anchor="ctr"/>
-          <a:lstStyle/>
-          <a:p>
-            <a:pPr algn="ctr"/>
-            <a:endParaRPr lang="pt-BR"/>
-          </a:p>
-        </p:txBody>
-      </p:sp>
-      <p:sp>
-        <p:nvSpPr>
-          <p:cNvPr id="21" name="Fluxograma: Conector 20"/>
-          <p:cNvSpPr/>
-          <p:nvPr/>
-        </p:nvSpPr>
-        <p:spPr>
-          <a:xfrm>
-            <a:off x="9562481" y="3838741"/>
-            <a:ext cx="257578" cy="257578"/>
-          </a:xfrm>
-          <a:prstGeom prst="flowChartConnector">
-            <a:avLst/>
-          </a:prstGeom>
-          <a:solidFill>
-            <a:srgbClr val="FFFF00"/>
-          </a:solidFill>
-          <a:ln>
-            <a:solidFill>
-              <a:schemeClr val="tx1"/>
-            </a:solidFill>
-          </a:ln>
-        </p:spPr>
-        <p:style>
-          <a:lnRef idx="2">
-            <a:schemeClr val="accent1">
-              <a:shade val="50000"/>
-            </a:schemeClr>
-          </a:lnRef>
-          <a:fillRef idx="1">
-            <a:schemeClr val="accent1"/>
-          </a:fillRef>
-          <a:effectRef idx="0">
-            <a:schemeClr val="accent1"/>
-          </a:effectRef>
-          <a:fontRef idx="minor">
-            <a:schemeClr val="lt1"/>
-          </a:fontRef>
-        </p:style>
-        <p:txBody>
-          <a:bodyPr rtlCol="0" anchor="ctr"/>
-          <a:lstStyle/>
-          <a:p>
-            <a:pPr algn="ctr"/>
-            <a:endParaRPr lang="pt-BR"/>
-          </a:p>
-        </p:txBody>
-      </p:sp>
-      <p:sp>
-        <p:nvSpPr>
-          <p:cNvPr id="22" name="Fluxograma: Conector 21"/>
-          <p:cNvSpPr/>
-          <p:nvPr/>
-        </p:nvSpPr>
-        <p:spPr>
-          <a:xfrm>
-            <a:off x="10089374" y="3842744"/>
-            <a:ext cx="257578" cy="257578"/>
-          </a:xfrm>
-          <a:prstGeom prst="flowChartConnector">
-            <a:avLst/>
-          </a:prstGeom>
-          <a:solidFill>
-            <a:srgbClr val="FFFF00"/>
-          </a:solidFill>
-          <a:ln>
-            <a:solidFill>
-              <a:schemeClr val="tx1"/>
-            </a:solidFill>
-          </a:ln>
-        </p:spPr>
-        <p:style>
-          <a:lnRef idx="2">
-            <a:schemeClr val="accent1">
-              <a:shade val="50000"/>
-            </a:schemeClr>
-          </a:lnRef>
-          <a:fillRef idx="1">
-            <a:schemeClr val="accent1"/>
-          </a:fillRef>
-          <a:effectRef idx="0">
-            <a:schemeClr val="accent1"/>
-          </a:effectRef>
-          <a:fontRef idx="minor">
-            <a:schemeClr val="lt1"/>
-          </a:fontRef>
-        </p:style>
-        <p:txBody>
-          <a:bodyPr rtlCol="0" anchor="ctr"/>
-          <a:lstStyle/>
-          <a:p>
-            <a:pPr algn="ctr"/>
-            <a:endParaRPr lang="pt-BR"/>
-          </a:p>
-        </p:txBody>
-      </p:sp>
-      <p:sp>
-        <p:nvSpPr>
-          <p:cNvPr id="23" name="Fluxograma: Conector 22"/>
-          <p:cNvSpPr/>
-          <p:nvPr/>
-        </p:nvSpPr>
-        <p:spPr>
-          <a:xfrm>
-            <a:off x="10646564" y="3838741"/>
-            <a:ext cx="257578" cy="257578"/>
-          </a:xfrm>
-          <a:prstGeom prst="flowChartConnector">
-            <a:avLst/>
-          </a:prstGeom>
-          <a:solidFill>
-            <a:srgbClr val="FFFF00"/>
-          </a:solidFill>
-          <a:ln>
-            <a:solidFill>
-              <a:schemeClr val="tx1"/>
-            </a:solidFill>
-          </a:ln>
-        </p:spPr>
-        <p:style>
-          <a:lnRef idx="2">
-            <a:schemeClr val="accent1">
-              <a:shade val="50000"/>
-            </a:schemeClr>
-          </a:lnRef>
-          <a:fillRef idx="1">
-            <a:schemeClr val="accent1"/>
-          </a:fillRef>
-          <a:effectRef idx="0">
-            <a:schemeClr val="accent1"/>
-          </a:effectRef>
-          <a:fontRef idx="minor">
-            <a:schemeClr val="lt1"/>
-          </a:fontRef>
-        </p:style>
-        <p:txBody>
-          <a:bodyPr rtlCol="0" anchor="ctr"/>
-          <a:lstStyle/>
-          <a:p>
-            <a:pPr algn="ctr"/>
-            <a:endParaRPr lang="pt-BR"/>
-          </a:p>
-        </p:txBody>
-      </p:sp>
-      <p:sp>
-        <p:nvSpPr>
-          <p:cNvPr id="24" name="Fluxograma: Conector 23"/>
-          <p:cNvSpPr/>
-          <p:nvPr/>
-        </p:nvSpPr>
-        <p:spPr>
-          <a:xfrm>
-            <a:off x="11147042" y="3838741"/>
-            <a:ext cx="257578" cy="257578"/>
-          </a:xfrm>
-          <a:prstGeom prst="flowChartConnector">
-            <a:avLst/>
-          </a:prstGeom>
-          <a:solidFill>
-            <a:srgbClr val="FFFF00"/>
-          </a:solidFill>
-          <a:ln>
-            <a:solidFill>
-              <a:schemeClr val="tx1"/>
-            </a:solidFill>
-          </a:ln>
-        </p:spPr>
-        <p:style>
-          <a:lnRef idx="2">
-            <a:schemeClr val="accent1">
-              <a:shade val="50000"/>
-            </a:schemeClr>
-          </a:lnRef>
-          <a:fillRef idx="1">
-            <a:schemeClr val="accent1"/>
-          </a:fillRef>
-          <a:effectRef idx="0">
-            <a:schemeClr val="accent1"/>
-          </a:effectRef>
-          <a:fontRef idx="minor">
-            <a:schemeClr val="lt1"/>
-          </a:fontRef>
-        </p:style>
-        <p:txBody>
-          <a:bodyPr rtlCol="0" anchor="ctr"/>
-          <a:lstStyle/>
-          <a:p>
-            <a:pPr algn="ctr"/>
-            <a:endParaRPr lang="pt-BR"/>
-          </a:p>
-        </p:txBody>
-      </p:sp>
-      <p:sp>
-        <p:nvSpPr>
-          <p:cNvPr id="25" name="Fluxograma: Conector 24"/>
-          <p:cNvSpPr/>
-          <p:nvPr/>
-        </p:nvSpPr>
-        <p:spPr>
-          <a:xfrm>
-            <a:off x="11673935" y="3838741"/>
-            <a:ext cx="257578" cy="257578"/>
-          </a:xfrm>
-          <a:prstGeom prst="flowChartConnector">
-            <a:avLst/>
-          </a:prstGeom>
-          <a:solidFill>
-            <a:srgbClr val="FFFF00"/>
-          </a:solidFill>
-          <a:ln>
-            <a:solidFill>
-              <a:schemeClr val="tx1"/>
-            </a:solidFill>
-          </a:ln>
-        </p:spPr>
-        <p:style>
-          <a:lnRef idx="2">
-            <a:schemeClr val="accent1">
-              <a:shade val="50000"/>
-            </a:schemeClr>
-          </a:lnRef>
-          <a:fillRef idx="1">
-            <a:schemeClr val="accent1"/>
-          </a:fillRef>
-          <a:effectRef idx="0">
-            <a:schemeClr val="accent1"/>
-          </a:effectRef>
-          <a:fontRef idx="minor">
-            <a:schemeClr val="lt1"/>
-          </a:fontRef>
-        </p:style>
-        <p:txBody>
-          <a:bodyPr rtlCol="0" anchor="ctr"/>
-          <a:lstStyle/>
-          <a:p>
-            <a:pPr algn="ctr"/>
-            <a:endParaRPr lang="pt-BR"/>
-          </a:p>
-        </p:txBody>
-      </p:sp>
-      <p:sp>
-        <p:nvSpPr>
-          <p:cNvPr id="26" name="Fluxograma: Conector 25"/>
-          <p:cNvSpPr/>
-          <p:nvPr/>
-        </p:nvSpPr>
-        <p:spPr>
-          <a:xfrm>
-            <a:off x="11673935" y="4396536"/>
-            <a:ext cx="257578" cy="257578"/>
-          </a:xfrm>
-          <a:prstGeom prst="flowChartConnector">
-            <a:avLst/>
-          </a:prstGeom>
-          <a:solidFill>
-            <a:srgbClr val="FFFF00"/>
-          </a:solidFill>
-          <a:ln>
-            <a:solidFill>
-              <a:schemeClr val="tx1"/>
-            </a:solidFill>
-          </a:ln>
-        </p:spPr>
-        <p:style>
-          <a:lnRef idx="2">
-            <a:schemeClr val="accent1">
-              <a:shade val="50000"/>
-            </a:schemeClr>
-          </a:lnRef>
-          <a:fillRef idx="1">
-            <a:schemeClr val="accent1"/>
-          </a:fillRef>
-          <a:effectRef idx="0">
-            <a:schemeClr val="accent1"/>
-          </a:effectRef>
-          <a:fontRef idx="minor">
-            <a:schemeClr val="lt1"/>
-          </a:fontRef>
-        </p:style>
-        <p:txBody>
-          <a:bodyPr rtlCol="0" anchor="ctr"/>
-          <a:lstStyle/>
-          <a:p>
-            <a:pPr algn="ctr"/>
-            <a:endParaRPr lang="pt-BR"/>
-          </a:p>
-        </p:txBody>
-      </p:sp>
-      <p:sp>
-        <p:nvSpPr>
-          <p:cNvPr id="27" name="Fluxograma: Conector 26"/>
-          <p:cNvSpPr/>
-          <p:nvPr/>
-        </p:nvSpPr>
-        <p:spPr>
-          <a:xfrm>
-            <a:off x="11678727" y="4915107"/>
-            <a:ext cx="257578" cy="257578"/>
-          </a:xfrm>
-          <a:prstGeom prst="flowChartConnector">
-            <a:avLst/>
-          </a:prstGeom>
-          <a:solidFill>
-            <a:srgbClr val="FFFF00"/>
-          </a:solidFill>
-          <a:ln>
-            <a:solidFill>
-              <a:schemeClr val="tx1"/>
-            </a:solidFill>
-          </a:ln>
-        </p:spPr>
-        <p:style>
-          <a:lnRef idx="2">
-            <a:schemeClr val="accent1">
-              <a:shade val="50000"/>
-            </a:schemeClr>
-          </a:lnRef>
-          <a:fillRef idx="1">
-            <a:schemeClr val="accent1"/>
-          </a:fillRef>
-          <a:effectRef idx="0">
-            <a:schemeClr val="accent1"/>
-          </a:effectRef>
-          <a:fontRef idx="minor">
-            <a:schemeClr val="lt1"/>
-          </a:fontRef>
-        </p:style>
-        <p:txBody>
-          <a:bodyPr rtlCol="0" anchor="ctr"/>
-          <a:lstStyle/>
-          <a:p>
-            <a:pPr algn="ctr"/>
-            <a:endParaRPr lang="pt-BR"/>
-          </a:p>
-        </p:txBody>
-      </p:sp>
-      <p:sp>
-        <p:nvSpPr>
-          <p:cNvPr id="28" name="Fluxograma: Conector 27"/>
-          <p:cNvSpPr/>
-          <p:nvPr/>
-        </p:nvSpPr>
-        <p:spPr>
-          <a:xfrm>
-            <a:off x="11673935" y="5472812"/>
-            <a:ext cx="257578" cy="257578"/>
-          </a:xfrm>
-          <a:prstGeom prst="flowChartConnector">
-            <a:avLst/>
-          </a:prstGeom>
-          <a:solidFill>
-            <a:srgbClr val="FFFF00"/>
-          </a:solidFill>
-          <a:ln>
-            <a:solidFill>
-              <a:schemeClr val="tx1"/>
-            </a:solidFill>
-          </a:ln>
-        </p:spPr>
-        <p:style>
-          <a:lnRef idx="2">
-            <a:schemeClr val="accent1">
-              <a:shade val="50000"/>
-            </a:schemeClr>
-          </a:lnRef>
-          <a:fillRef idx="1">
-            <a:schemeClr val="accent1"/>
-          </a:fillRef>
-          <a:effectRef idx="0">
-            <a:schemeClr val="accent1"/>
-          </a:effectRef>
-          <a:fontRef idx="minor">
-            <a:schemeClr val="lt1"/>
-          </a:fontRef>
-        </p:style>
-        <p:txBody>
-          <a:bodyPr rtlCol="0" anchor="ctr"/>
-          <a:lstStyle/>
-          <a:p>
-            <a:pPr algn="ctr"/>
-            <a:endParaRPr lang="pt-BR"/>
-          </a:p>
-        </p:txBody>
-      </p:sp>
-      <p:sp>
-        <p:nvSpPr>
-          <p:cNvPr id="34" name="Fluxograma: Conector 33"/>
-          <p:cNvSpPr/>
-          <p:nvPr/>
-        </p:nvSpPr>
-        <p:spPr>
-          <a:xfrm>
-            <a:off x="11673935" y="5989429"/>
-            <a:ext cx="257578" cy="257578"/>
-          </a:xfrm>
-          <a:prstGeom prst="flowChartConnector">
-            <a:avLst/>
-          </a:prstGeom>
-          <a:solidFill>
-            <a:srgbClr val="FFFF00"/>
-          </a:solidFill>
-          <a:ln>
-            <a:solidFill>
-              <a:schemeClr val="tx1"/>
-            </a:solidFill>
-          </a:ln>
-        </p:spPr>
-        <p:style>
-          <a:lnRef idx="2">
-            <a:schemeClr val="accent1">
-              <a:shade val="50000"/>
-            </a:schemeClr>
-          </a:lnRef>
-          <a:fillRef idx="1">
-            <a:schemeClr val="accent1"/>
-          </a:fillRef>
-          <a:effectRef idx="0">
-            <a:schemeClr val="accent1"/>
-          </a:effectRef>
-          <a:fontRef idx="minor">
-            <a:schemeClr val="lt1"/>
-          </a:fontRef>
-        </p:style>
-        <p:txBody>
-          <a:bodyPr rtlCol="0" anchor="ctr"/>
-          <a:lstStyle/>
-          <a:p>
-            <a:pPr algn="ctr"/>
-            <a:endParaRPr lang="pt-BR"/>
-          </a:p>
-        </p:txBody>
-      </p:sp>
+      <p:pic>
+        <p:nvPicPr>
+          <p:cNvPr id="4" name="Imagem 3"/>
+          <p:cNvPicPr>
+            <a:picLocks noChangeAspect="1"/>
+          </p:cNvPicPr>
+          <p:nvPr/>
+        </p:nvPicPr>
+        <p:blipFill>
+          <a:blip r:embed="rId5">
+            <a:extLst>
+              <a:ext uri="{28A0092B-C50C-407E-A947-70E740481C1C}">
+                <a14:useLocalDpi xmlns:a14="http://schemas.microsoft.com/office/drawing/2010/main" val="0"/>
+              </a:ext>
+            </a:extLst>
+          </a:blip>
+          <a:stretch>
+            <a:fillRect/>
+          </a:stretch>
+        </p:blipFill>
+        <p:spPr>
+          <a:xfrm>
+            <a:off x="3193960" y="2532149"/>
+            <a:ext cx="5947854" cy="2807387"/>
+          </a:xfrm>
+          <a:prstGeom prst="rect">
+            <a:avLst/>
+          </a:prstGeom>
+        </p:spPr>
+      </p:pic>
     </p:spTree>
     <p:extLst>
       <p:ext uri="{BB962C8B-B14F-4D97-AF65-F5344CB8AC3E}">
-        <p14:creationId xmlns:p14="http://schemas.microsoft.com/office/powerpoint/2010/main" val="2668113434"/>
+        <p14:creationId xmlns:p14="http://schemas.microsoft.com/office/powerpoint/2010/main" val="4254529269"/>
       </p:ext>
     </p:extLst>
   </p:cSld>
@@ -18614,7 +17745,7 @@
           <a:p>
             <a:r>
               <a:rPr lang="pt-BR" dirty="0" smtClean="0"/>
-              <a:t>Referências</a:t>
+              <a:t>Obrigado!</a:t>
             </a:r>
             <a:endParaRPr lang="pt-BR" dirty="0"/>
           </a:p>
@@ -18637,70 +17768,15 @@
           </a:xfrm>
         </p:spPr>
         <p:txBody>
-          <a:bodyPr/>
-          <a:lstStyle/>
-          <a:p>
-            <a:r>
-              <a:rPr lang="pt-BR" dirty="0" smtClean="0"/>
-              <a:t>W3schools Treinamento e desenvolvimento web. Disponível em &lt;http</a:t>
-            </a:r>
-            <a:r>
-              <a:rPr lang="pt-BR" dirty="0"/>
-              <a:t>://www.w3schools.com</a:t>
-            </a:r>
-            <a:r>
-              <a:rPr lang="pt-BR" dirty="0" smtClean="0"/>
-              <a:t>/&gt; Acesso em: 10 Abr. 2016</a:t>
-            </a:r>
-          </a:p>
-          <a:p>
-            <a:endParaRPr lang="pt-BR" dirty="0" smtClean="0"/>
-          </a:p>
-          <a:p>
-            <a:r>
-              <a:rPr lang="pt-BR" dirty="0" smtClean="0"/>
-              <a:t>Mozilla </a:t>
-            </a:r>
-            <a:r>
-              <a:rPr lang="pt-BR" dirty="0" err="1" smtClean="0"/>
-              <a:t>Developer</a:t>
-            </a:r>
-            <a:r>
-              <a:rPr lang="pt-BR" dirty="0" smtClean="0"/>
-              <a:t> Network. Disponível em: &lt;https</a:t>
-            </a:r>
-            <a:r>
-              <a:rPr lang="pt-BR" dirty="0"/>
-              <a:t>://developer.mozilla.org/pt-BR</a:t>
-            </a:r>
-            <a:r>
-              <a:rPr lang="pt-BR" dirty="0" smtClean="0"/>
-              <a:t>/&gt; Acesso em: 10. Abr. 2016</a:t>
-            </a:r>
-          </a:p>
-          <a:p>
-            <a:endParaRPr lang="pt-BR" dirty="0"/>
-          </a:p>
-          <a:p>
-            <a:r>
-              <a:rPr lang="pt-BR" dirty="0" err="1" smtClean="0"/>
-              <a:t>Caelum</a:t>
-            </a:r>
-            <a:r>
-              <a:rPr lang="pt-BR" dirty="0" smtClean="0"/>
-              <a:t> Ensino e Inovação. Desenvolvimento Web com HTML, CSS e </a:t>
-            </a:r>
-            <a:r>
-              <a:rPr lang="pt-BR" dirty="0" err="1" smtClean="0"/>
-              <a:t>JavaScript</a:t>
-            </a:r>
-            <a:r>
-              <a:rPr lang="pt-BR" dirty="0" smtClean="0"/>
-              <a:t>. Curso WD-43.</a:t>
-            </a:r>
-          </a:p>
-          <a:p>
-            <a:endParaRPr lang="pt-BR" dirty="0"/>
+          <a:bodyPr>
+            <a:noAutofit/>
+          </a:bodyPr>
+          <a:lstStyle/>
+          <a:p>
+            <a:endParaRPr lang="pt-BR" sz="2200" dirty="0"/>
+          </a:p>
+          <a:p>
+            <a:endParaRPr lang="pt-BR" sz="2200" dirty="0"/>
           </a:p>
         </p:txBody>
       </p:sp>
@@ -18796,7 +17872,7 @@
       </p:pic>
       <p:sp>
         <p:nvSpPr>
-          <p:cNvPr id="8" name="CaixaDeTexto 7"/>
+          <p:cNvPr id="10" name="CaixaDeTexto 9"/>
           <p:cNvSpPr txBox="1"/>
           <p:nvPr/>
         </p:nvSpPr>
@@ -18821,6 +17897,1289 @@
               <a:rPr lang="pt-BR" dirty="0" smtClean="0"/>
               <a:t>41</a:t>
             </a:r>
+            <a:endParaRPr lang="pt-BR" dirty="0"/>
+          </a:p>
+        </p:txBody>
+      </p:sp>
+      <p:sp>
+        <p:nvSpPr>
+          <p:cNvPr id="6" name="Pizza 5"/>
+          <p:cNvSpPr/>
+          <p:nvPr/>
+        </p:nvSpPr>
+        <p:spPr>
+          <a:xfrm rot="3063928">
+            <a:off x="2756079" y="3065172"/>
+            <a:ext cx="1738648" cy="1661374"/>
+          </a:xfrm>
+          <a:prstGeom prst="pie">
+            <a:avLst/>
+          </a:prstGeom>
+          <a:solidFill>
+            <a:srgbClr val="FFFF00"/>
+          </a:solidFill>
+          <a:ln>
+            <a:solidFill>
+              <a:schemeClr val="tx1"/>
+            </a:solidFill>
+          </a:ln>
+        </p:spPr>
+        <p:style>
+          <a:lnRef idx="2">
+            <a:schemeClr val="accent1">
+              <a:shade val="50000"/>
+            </a:schemeClr>
+          </a:lnRef>
+          <a:fillRef idx="1">
+            <a:schemeClr val="accent1"/>
+          </a:fillRef>
+          <a:effectRef idx="0">
+            <a:schemeClr val="accent1"/>
+          </a:effectRef>
+          <a:fontRef idx="minor">
+            <a:schemeClr val="lt1"/>
+          </a:fontRef>
+        </p:style>
+        <p:txBody>
+          <a:bodyPr rtlCol="0" anchor="ctr"/>
+          <a:lstStyle/>
+          <a:p>
+            <a:pPr algn="ctr"/>
+            <a:endParaRPr lang="pt-BR">
+              <a:solidFill>
+                <a:schemeClr val="tx1"/>
+              </a:solidFill>
+            </a:endParaRPr>
+          </a:p>
+        </p:txBody>
+      </p:sp>
+      <p:sp>
+        <p:nvSpPr>
+          <p:cNvPr id="8" name="Fluxograma: Conector 7"/>
+          <p:cNvSpPr/>
+          <p:nvPr/>
+        </p:nvSpPr>
+        <p:spPr>
+          <a:xfrm>
+            <a:off x="3412901" y="3348507"/>
+            <a:ext cx="257578" cy="257578"/>
+          </a:xfrm>
+          <a:prstGeom prst="flowChartConnector">
+            <a:avLst/>
+          </a:prstGeom>
+          <a:solidFill>
+            <a:schemeClr val="tx1"/>
+          </a:solidFill>
+          <a:ln>
+            <a:solidFill>
+              <a:schemeClr val="tx1"/>
+            </a:solidFill>
+          </a:ln>
+        </p:spPr>
+        <p:style>
+          <a:lnRef idx="2">
+            <a:schemeClr val="accent1">
+              <a:shade val="50000"/>
+            </a:schemeClr>
+          </a:lnRef>
+          <a:fillRef idx="1">
+            <a:schemeClr val="accent1"/>
+          </a:fillRef>
+          <a:effectRef idx="0">
+            <a:schemeClr val="accent1"/>
+          </a:effectRef>
+          <a:fontRef idx="minor">
+            <a:schemeClr val="lt1"/>
+          </a:fontRef>
+        </p:style>
+        <p:txBody>
+          <a:bodyPr rtlCol="0" anchor="ctr"/>
+          <a:lstStyle/>
+          <a:p>
+            <a:pPr algn="ctr"/>
+            <a:endParaRPr lang="pt-BR"/>
+          </a:p>
+        </p:txBody>
+      </p:sp>
+      <p:sp>
+        <p:nvSpPr>
+          <p:cNvPr id="11" name="Fluxograma: Conector 10"/>
+          <p:cNvSpPr/>
+          <p:nvPr/>
+        </p:nvSpPr>
+        <p:spPr>
+          <a:xfrm>
+            <a:off x="4377846" y="3817019"/>
+            <a:ext cx="257578" cy="257578"/>
+          </a:xfrm>
+          <a:prstGeom prst="flowChartConnector">
+            <a:avLst/>
+          </a:prstGeom>
+          <a:solidFill>
+            <a:srgbClr val="FFFF00"/>
+          </a:solidFill>
+          <a:ln>
+            <a:solidFill>
+              <a:schemeClr val="tx1"/>
+            </a:solidFill>
+          </a:ln>
+        </p:spPr>
+        <p:style>
+          <a:lnRef idx="2">
+            <a:schemeClr val="accent1">
+              <a:shade val="50000"/>
+            </a:schemeClr>
+          </a:lnRef>
+          <a:fillRef idx="1">
+            <a:schemeClr val="accent1"/>
+          </a:fillRef>
+          <a:effectRef idx="0">
+            <a:schemeClr val="accent1"/>
+          </a:effectRef>
+          <a:fontRef idx="minor">
+            <a:schemeClr val="lt1"/>
+          </a:fontRef>
+        </p:style>
+        <p:txBody>
+          <a:bodyPr rtlCol="0" anchor="ctr"/>
+          <a:lstStyle/>
+          <a:p>
+            <a:pPr algn="ctr"/>
+            <a:endParaRPr lang="pt-BR"/>
+          </a:p>
+        </p:txBody>
+      </p:sp>
+      <p:sp>
+        <p:nvSpPr>
+          <p:cNvPr id="12" name="Fluxograma: Conector 11"/>
+          <p:cNvSpPr/>
+          <p:nvPr/>
+        </p:nvSpPr>
+        <p:spPr>
+          <a:xfrm>
+            <a:off x="4878324" y="3817019"/>
+            <a:ext cx="257578" cy="257578"/>
+          </a:xfrm>
+          <a:prstGeom prst="flowChartConnector">
+            <a:avLst/>
+          </a:prstGeom>
+          <a:solidFill>
+            <a:srgbClr val="FFFF00"/>
+          </a:solidFill>
+          <a:ln>
+            <a:solidFill>
+              <a:schemeClr val="tx1"/>
+            </a:solidFill>
+          </a:ln>
+        </p:spPr>
+        <p:style>
+          <a:lnRef idx="2">
+            <a:schemeClr val="accent1">
+              <a:shade val="50000"/>
+            </a:schemeClr>
+          </a:lnRef>
+          <a:fillRef idx="1">
+            <a:schemeClr val="accent1"/>
+          </a:fillRef>
+          <a:effectRef idx="0">
+            <a:schemeClr val="accent1"/>
+          </a:effectRef>
+          <a:fontRef idx="minor">
+            <a:schemeClr val="lt1"/>
+          </a:fontRef>
+        </p:style>
+        <p:txBody>
+          <a:bodyPr rtlCol="0" anchor="ctr"/>
+          <a:lstStyle/>
+          <a:p>
+            <a:pPr algn="ctr"/>
+            <a:endParaRPr lang="pt-BR"/>
+          </a:p>
+        </p:txBody>
+      </p:sp>
+      <p:sp>
+        <p:nvSpPr>
+          <p:cNvPr id="13" name="Fluxograma: Conector 12"/>
+          <p:cNvSpPr/>
+          <p:nvPr/>
+        </p:nvSpPr>
+        <p:spPr>
+          <a:xfrm>
+            <a:off x="5405217" y="3817019"/>
+            <a:ext cx="257578" cy="257578"/>
+          </a:xfrm>
+          <a:prstGeom prst="flowChartConnector">
+            <a:avLst/>
+          </a:prstGeom>
+          <a:solidFill>
+            <a:srgbClr val="FFFF00"/>
+          </a:solidFill>
+          <a:ln>
+            <a:solidFill>
+              <a:schemeClr val="tx1"/>
+            </a:solidFill>
+          </a:ln>
+        </p:spPr>
+        <p:style>
+          <a:lnRef idx="2">
+            <a:schemeClr val="accent1">
+              <a:shade val="50000"/>
+            </a:schemeClr>
+          </a:lnRef>
+          <a:fillRef idx="1">
+            <a:schemeClr val="accent1"/>
+          </a:fillRef>
+          <a:effectRef idx="0">
+            <a:schemeClr val="accent1"/>
+          </a:effectRef>
+          <a:fontRef idx="minor">
+            <a:schemeClr val="lt1"/>
+          </a:fontRef>
+        </p:style>
+        <p:txBody>
+          <a:bodyPr rtlCol="0" anchor="ctr"/>
+          <a:lstStyle/>
+          <a:p>
+            <a:pPr algn="ctr"/>
+            <a:endParaRPr lang="pt-BR"/>
+          </a:p>
+        </p:txBody>
+      </p:sp>
+      <p:sp>
+        <p:nvSpPr>
+          <p:cNvPr id="14" name="Fluxograma: Conector 13"/>
+          <p:cNvSpPr/>
+          <p:nvPr/>
+        </p:nvSpPr>
+        <p:spPr>
+          <a:xfrm>
+            <a:off x="5932110" y="3821022"/>
+            <a:ext cx="257578" cy="257578"/>
+          </a:xfrm>
+          <a:prstGeom prst="flowChartConnector">
+            <a:avLst/>
+          </a:prstGeom>
+          <a:solidFill>
+            <a:srgbClr val="FFFF00"/>
+          </a:solidFill>
+          <a:ln>
+            <a:solidFill>
+              <a:schemeClr val="tx1"/>
+            </a:solidFill>
+          </a:ln>
+        </p:spPr>
+        <p:style>
+          <a:lnRef idx="2">
+            <a:schemeClr val="accent1">
+              <a:shade val="50000"/>
+            </a:schemeClr>
+          </a:lnRef>
+          <a:fillRef idx="1">
+            <a:schemeClr val="accent1"/>
+          </a:fillRef>
+          <a:effectRef idx="0">
+            <a:schemeClr val="accent1"/>
+          </a:effectRef>
+          <a:fontRef idx="minor">
+            <a:schemeClr val="lt1"/>
+          </a:fontRef>
+        </p:style>
+        <p:txBody>
+          <a:bodyPr rtlCol="0" anchor="ctr"/>
+          <a:lstStyle/>
+          <a:p>
+            <a:pPr algn="ctr"/>
+            <a:endParaRPr lang="pt-BR"/>
+          </a:p>
+        </p:txBody>
+      </p:sp>
+      <p:sp>
+        <p:nvSpPr>
+          <p:cNvPr id="15" name="Fluxograma: Conector 14"/>
+          <p:cNvSpPr/>
+          <p:nvPr/>
+        </p:nvSpPr>
+        <p:spPr>
+          <a:xfrm>
+            <a:off x="6459003" y="3813016"/>
+            <a:ext cx="257578" cy="257578"/>
+          </a:xfrm>
+          <a:prstGeom prst="flowChartConnector">
+            <a:avLst/>
+          </a:prstGeom>
+          <a:solidFill>
+            <a:srgbClr val="FFFF00"/>
+          </a:solidFill>
+          <a:ln>
+            <a:solidFill>
+              <a:schemeClr val="tx1"/>
+            </a:solidFill>
+          </a:ln>
+        </p:spPr>
+        <p:style>
+          <a:lnRef idx="2">
+            <a:schemeClr val="accent1">
+              <a:shade val="50000"/>
+            </a:schemeClr>
+          </a:lnRef>
+          <a:fillRef idx="1">
+            <a:schemeClr val="accent1"/>
+          </a:fillRef>
+          <a:effectRef idx="0">
+            <a:schemeClr val="accent1"/>
+          </a:effectRef>
+          <a:fontRef idx="minor">
+            <a:schemeClr val="lt1"/>
+          </a:fontRef>
+        </p:style>
+        <p:txBody>
+          <a:bodyPr rtlCol="0" anchor="ctr"/>
+          <a:lstStyle/>
+          <a:p>
+            <a:pPr algn="ctr"/>
+            <a:endParaRPr lang="pt-BR"/>
+          </a:p>
+        </p:txBody>
+      </p:sp>
+      <p:sp>
+        <p:nvSpPr>
+          <p:cNvPr id="16" name="Fluxograma: Conector 15"/>
+          <p:cNvSpPr/>
+          <p:nvPr/>
+        </p:nvSpPr>
+        <p:spPr>
+          <a:xfrm>
+            <a:off x="6959481" y="3813016"/>
+            <a:ext cx="257578" cy="257578"/>
+          </a:xfrm>
+          <a:prstGeom prst="flowChartConnector">
+            <a:avLst/>
+          </a:prstGeom>
+          <a:solidFill>
+            <a:srgbClr val="FFFF00"/>
+          </a:solidFill>
+          <a:ln>
+            <a:solidFill>
+              <a:schemeClr val="tx1"/>
+            </a:solidFill>
+          </a:ln>
+        </p:spPr>
+        <p:style>
+          <a:lnRef idx="2">
+            <a:schemeClr val="accent1">
+              <a:shade val="50000"/>
+            </a:schemeClr>
+          </a:lnRef>
+          <a:fillRef idx="1">
+            <a:schemeClr val="accent1"/>
+          </a:fillRef>
+          <a:effectRef idx="0">
+            <a:schemeClr val="accent1"/>
+          </a:effectRef>
+          <a:fontRef idx="minor">
+            <a:schemeClr val="lt1"/>
+          </a:fontRef>
+        </p:style>
+        <p:txBody>
+          <a:bodyPr rtlCol="0" anchor="ctr"/>
+          <a:lstStyle/>
+          <a:p>
+            <a:pPr algn="ctr"/>
+            <a:endParaRPr lang="pt-BR"/>
+          </a:p>
+        </p:txBody>
+      </p:sp>
+      <p:sp>
+        <p:nvSpPr>
+          <p:cNvPr id="17" name="Fluxograma: Conector 16"/>
+          <p:cNvSpPr/>
+          <p:nvPr/>
+        </p:nvSpPr>
+        <p:spPr>
+          <a:xfrm>
+            <a:off x="7486374" y="3813016"/>
+            <a:ext cx="257578" cy="257578"/>
+          </a:xfrm>
+          <a:prstGeom prst="flowChartConnector">
+            <a:avLst/>
+          </a:prstGeom>
+          <a:solidFill>
+            <a:srgbClr val="FFFF00"/>
+          </a:solidFill>
+          <a:ln>
+            <a:solidFill>
+              <a:schemeClr val="tx1"/>
+            </a:solidFill>
+          </a:ln>
+        </p:spPr>
+        <p:style>
+          <a:lnRef idx="2">
+            <a:schemeClr val="accent1">
+              <a:shade val="50000"/>
+            </a:schemeClr>
+          </a:lnRef>
+          <a:fillRef idx="1">
+            <a:schemeClr val="accent1"/>
+          </a:fillRef>
+          <a:effectRef idx="0">
+            <a:schemeClr val="accent1"/>
+          </a:effectRef>
+          <a:fontRef idx="minor">
+            <a:schemeClr val="lt1"/>
+          </a:fontRef>
+        </p:style>
+        <p:txBody>
+          <a:bodyPr rtlCol="0" anchor="ctr"/>
+          <a:lstStyle/>
+          <a:p>
+            <a:pPr algn="ctr"/>
+            <a:endParaRPr lang="pt-BR"/>
+          </a:p>
+        </p:txBody>
+      </p:sp>
+      <p:sp>
+        <p:nvSpPr>
+          <p:cNvPr id="18" name="Fluxograma: Conector 17"/>
+          <p:cNvSpPr/>
+          <p:nvPr/>
+        </p:nvSpPr>
+        <p:spPr>
+          <a:xfrm>
+            <a:off x="8013267" y="3817019"/>
+            <a:ext cx="257578" cy="257578"/>
+          </a:xfrm>
+          <a:prstGeom prst="flowChartConnector">
+            <a:avLst/>
+          </a:prstGeom>
+          <a:solidFill>
+            <a:srgbClr val="FFFF00"/>
+          </a:solidFill>
+          <a:ln>
+            <a:solidFill>
+              <a:schemeClr val="tx1"/>
+            </a:solidFill>
+          </a:ln>
+        </p:spPr>
+        <p:style>
+          <a:lnRef idx="2">
+            <a:schemeClr val="accent1">
+              <a:shade val="50000"/>
+            </a:schemeClr>
+          </a:lnRef>
+          <a:fillRef idx="1">
+            <a:schemeClr val="accent1"/>
+          </a:fillRef>
+          <a:effectRef idx="0">
+            <a:schemeClr val="accent1"/>
+          </a:effectRef>
+          <a:fontRef idx="minor">
+            <a:schemeClr val="lt1"/>
+          </a:fontRef>
+        </p:style>
+        <p:txBody>
+          <a:bodyPr rtlCol="0" anchor="ctr"/>
+          <a:lstStyle/>
+          <a:p>
+            <a:pPr algn="ctr"/>
+            <a:endParaRPr lang="pt-BR"/>
+          </a:p>
+        </p:txBody>
+      </p:sp>
+      <p:sp>
+        <p:nvSpPr>
+          <p:cNvPr id="19" name="Fluxograma: Conector 18"/>
+          <p:cNvSpPr/>
+          <p:nvPr/>
+        </p:nvSpPr>
+        <p:spPr>
+          <a:xfrm>
+            <a:off x="8535110" y="3838741"/>
+            <a:ext cx="257578" cy="257578"/>
+          </a:xfrm>
+          <a:prstGeom prst="flowChartConnector">
+            <a:avLst/>
+          </a:prstGeom>
+          <a:solidFill>
+            <a:srgbClr val="FFFF00"/>
+          </a:solidFill>
+          <a:ln>
+            <a:solidFill>
+              <a:schemeClr val="tx1"/>
+            </a:solidFill>
+          </a:ln>
+        </p:spPr>
+        <p:style>
+          <a:lnRef idx="2">
+            <a:schemeClr val="accent1">
+              <a:shade val="50000"/>
+            </a:schemeClr>
+          </a:lnRef>
+          <a:fillRef idx="1">
+            <a:schemeClr val="accent1"/>
+          </a:fillRef>
+          <a:effectRef idx="0">
+            <a:schemeClr val="accent1"/>
+          </a:effectRef>
+          <a:fontRef idx="minor">
+            <a:schemeClr val="lt1"/>
+          </a:fontRef>
+        </p:style>
+        <p:txBody>
+          <a:bodyPr rtlCol="0" anchor="ctr"/>
+          <a:lstStyle/>
+          <a:p>
+            <a:pPr algn="ctr"/>
+            <a:endParaRPr lang="pt-BR"/>
+          </a:p>
+        </p:txBody>
+      </p:sp>
+      <p:sp>
+        <p:nvSpPr>
+          <p:cNvPr id="20" name="Fluxograma: Conector 19"/>
+          <p:cNvSpPr/>
+          <p:nvPr/>
+        </p:nvSpPr>
+        <p:spPr>
+          <a:xfrm>
+            <a:off x="9035588" y="3838741"/>
+            <a:ext cx="257578" cy="257578"/>
+          </a:xfrm>
+          <a:prstGeom prst="flowChartConnector">
+            <a:avLst/>
+          </a:prstGeom>
+          <a:solidFill>
+            <a:srgbClr val="FFFF00"/>
+          </a:solidFill>
+          <a:ln>
+            <a:solidFill>
+              <a:schemeClr val="tx1"/>
+            </a:solidFill>
+          </a:ln>
+        </p:spPr>
+        <p:style>
+          <a:lnRef idx="2">
+            <a:schemeClr val="accent1">
+              <a:shade val="50000"/>
+            </a:schemeClr>
+          </a:lnRef>
+          <a:fillRef idx="1">
+            <a:schemeClr val="accent1"/>
+          </a:fillRef>
+          <a:effectRef idx="0">
+            <a:schemeClr val="accent1"/>
+          </a:effectRef>
+          <a:fontRef idx="minor">
+            <a:schemeClr val="lt1"/>
+          </a:fontRef>
+        </p:style>
+        <p:txBody>
+          <a:bodyPr rtlCol="0" anchor="ctr"/>
+          <a:lstStyle/>
+          <a:p>
+            <a:pPr algn="ctr"/>
+            <a:endParaRPr lang="pt-BR"/>
+          </a:p>
+        </p:txBody>
+      </p:sp>
+      <p:sp>
+        <p:nvSpPr>
+          <p:cNvPr id="21" name="Fluxograma: Conector 20"/>
+          <p:cNvSpPr/>
+          <p:nvPr/>
+        </p:nvSpPr>
+        <p:spPr>
+          <a:xfrm>
+            <a:off x="9562481" y="3838741"/>
+            <a:ext cx="257578" cy="257578"/>
+          </a:xfrm>
+          <a:prstGeom prst="flowChartConnector">
+            <a:avLst/>
+          </a:prstGeom>
+          <a:solidFill>
+            <a:srgbClr val="FFFF00"/>
+          </a:solidFill>
+          <a:ln>
+            <a:solidFill>
+              <a:schemeClr val="tx1"/>
+            </a:solidFill>
+          </a:ln>
+        </p:spPr>
+        <p:style>
+          <a:lnRef idx="2">
+            <a:schemeClr val="accent1">
+              <a:shade val="50000"/>
+            </a:schemeClr>
+          </a:lnRef>
+          <a:fillRef idx="1">
+            <a:schemeClr val="accent1"/>
+          </a:fillRef>
+          <a:effectRef idx="0">
+            <a:schemeClr val="accent1"/>
+          </a:effectRef>
+          <a:fontRef idx="minor">
+            <a:schemeClr val="lt1"/>
+          </a:fontRef>
+        </p:style>
+        <p:txBody>
+          <a:bodyPr rtlCol="0" anchor="ctr"/>
+          <a:lstStyle/>
+          <a:p>
+            <a:pPr algn="ctr"/>
+            <a:endParaRPr lang="pt-BR"/>
+          </a:p>
+        </p:txBody>
+      </p:sp>
+      <p:sp>
+        <p:nvSpPr>
+          <p:cNvPr id="22" name="Fluxograma: Conector 21"/>
+          <p:cNvSpPr/>
+          <p:nvPr/>
+        </p:nvSpPr>
+        <p:spPr>
+          <a:xfrm>
+            <a:off x="10089374" y="3842744"/>
+            <a:ext cx="257578" cy="257578"/>
+          </a:xfrm>
+          <a:prstGeom prst="flowChartConnector">
+            <a:avLst/>
+          </a:prstGeom>
+          <a:solidFill>
+            <a:srgbClr val="FFFF00"/>
+          </a:solidFill>
+          <a:ln>
+            <a:solidFill>
+              <a:schemeClr val="tx1"/>
+            </a:solidFill>
+          </a:ln>
+        </p:spPr>
+        <p:style>
+          <a:lnRef idx="2">
+            <a:schemeClr val="accent1">
+              <a:shade val="50000"/>
+            </a:schemeClr>
+          </a:lnRef>
+          <a:fillRef idx="1">
+            <a:schemeClr val="accent1"/>
+          </a:fillRef>
+          <a:effectRef idx="0">
+            <a:schemeClr val="accent1"/>
+          </a:effectRef>
+          <a:fontRef idx="minor">
+            <a:schemeClr val="lt1"/>
+          </a:fontRef>
+        </p:style>
+        <p:txBody>
+          <a:bodyPr rtlCol="0" anchor="ctr"/>
+          <a:lstStyle/>
+          <a:p>
+            <a:pPr algn="ctr"/>
+            <a:endParaRPr lang="pt-BR"/>
+          </a:p>
+        </p:txBody>
+      </p:sp>
+      <p:sp>
+        <p:nvSpPr>
+          <p:cNvPr id="23" name="Fluxograma: Conector 22"/>
+          <p:cNvSpPr/>
+          <p:nvPr/>
+        </p:nvSpPr>
+        <p:spPr>
+          <a:xfrm>
+            <a:off x="10646564" y="3838741"/>
+            <a:ext cx="257578" cy="257578"/>
+          </a:xfrm>
+          <a:prstGeom prst="flowChartConnector">
+            <a:avLst/>
+          </a:prstGeom>
+          <a:solidFill>
+            <a:srgbClr val="FFFF00"/>
+          </a:solidFill>
+          <a:ln>
+            <a:solidFill>
+              <a:schemeClr val="tx1"/>
+            </a:solidFill>
+          </a:ln>
+        </p:spPr>
+        <p:style>
+          <a:lnRef idx="2">
+            <a:schemeClr val="accent1">
+              <a:shade val="50000"/>
+            </a:schemeClr>
+          </a:lnRef>
+          <a:fillRef idx="1">
+            <a:schemeClr val="accent1"/>
+          </a:fillRef>
+          <a:effectRef idx="0">
+            <a:schemeClr val="accent1"/>
+          </a:effectRef>
+          <a:fontRef idx="minor">
+            <a:schemeClr val="lt1"/>
+          </a:fontRef>
+        </p:style>
+        <p:txBody>
+          <a:bodyPr rtlCol="0" anchor="ctr"/>
+          <a:lstStyle/>
+          <a:p>
+            <a:pPr algn="ctr"/>
+            <a:endParaRPr lang="pt-BR"/>
+          </a:p>
+        </p:txBody>
+      </p:sp>
+      <p:sp>
+        <p:nvSpPr>
+          <p:cNvPr id="24" name="Fluxograma: Conector 23"/>
+          <p:cNvSpPr/>
+          <p:nvPr/>
+        </p:nvSpPr>
+        <p:spPr>
+          <a:xfrm>
+            <a:off x="11147042" y="3838741"/>
+            <a:ext cx="257578" cy="257578"/>
+          </a:xfrm>
+          <a:prstGeom prst="flowChartConnector">
+            <a:avLst/>
+          </a:prstGeom>
+          <a:solidFill>
+            <a:srgbClr val="FFFF00"/>
+          </a:solidFill>
+          <a:ln>
+            <a:solidFill>
+              <a:schemeClr val="tx1"/>
+            </a:solidFill>
+          </a:ln>
+        </p:spPr>
+        <p:style>
+          <a:lnRef idx="2">
+            <a:schemeClr val="accent1">
+              <a:shade val="50000"/>
+            </a:schemeClr>
+          </a:lnRef>
+          <a:fillRef idx="1">
+            <a:schemeClr val="accent1"/>
+          </a:fillRef>
+          <a:effectRef idx="0">
+            <a:schemeClr val="accent1"/>
+          </a:effectRef>
+          <a:fontRef idx="minor">
+            <a:schemeClr val="lt1"/>
+          </a:fontRef>
+        </p:style>
+        <p:txBody>
+          <a:bodyPr rtlCol="0" anchor="ctr"/>
+          <a:lstStyle/>
+          <a:p>
+            <a:pPr algn="ctr"/>
+            <a:endParaRPr lang="pt-BR"/>
+          </a:p>
+        </p:txBody>
+      </p:sp>
+      <p:sp>
+        <p:nvSpPr>
+          <p:cNvPr id="25" name="Fluxograma: Conector 24"/>
+          <p:cNvSpPr/>
+          <p:nvPr/>
+        </p:nvSpPr>
+        <p:spPr>
+          <a:xfrm>
+            <a:off x="11673935" y="3838741"/>
+            <a:ext cx="257578" cy="257578"/>
+          </a:xfrm>
+          <a:prstGeom prst="flowChartConnector">
+            <a:avLst/>
+          </a:prstGeom>
+          <a:solidFill>
+            <a:srgbClr val="FFFF00"/>
+          </a:solidFill>
+          <a:ln>
+            <a:solidFill>
+              <a:schemeClr val="tx1"/>
+            </a:solidFill>
+          </a:ln>
+        </p:spPr>
+        <p:style>
+          <a:lnRef idx="2">
+            <a:schemeClr val="accent1">
+              <a:shade val="50000"/>
+            </a:schemeClr>
+          </a:lnRef>
+          <a:fillRef idx="1">
+            <a:schemeClr val="accent1"/>
+          </a:fillRef>
+          <a:effectRef idx="0">
+            <a:schemeClr val="accent1"/>
+          </a:effectRef>
+          <a:fontRef idx="minor">
+            <a:schemeClr val="lt1"/>
+          </a:fontRef>
+        </p:style>
+        <p:txBody>
+          <a:bodyPr rtlCol="0" anchor="ctr"/>
+          <a:lstStyle/>
+          <a:p>
+            <a:pPr algn="ctr"/>
+            <a:endParaRPr lang="pt-BR"/>
+          </a:p>
+        </p:txBody>
+      </p:sp>
+      <p:sp>
+        <p:nvSpPr>
+          <p:cNvPr id="26" name="Fluxograma: Conector 25"/>
+          <p:cNvSpPr/>
+          <p:nvPr/>
+        </p:nvSpPr>
+        <p:spPr>
+          <a:xfrm>
+            <a:off x="11673935" y="4396536"/>
+            <a:ext cx="257578" cy="257578"/>
+          </a:xfrm>
+          <a:prstGeom prst="flowChartConnector">
+            <a:avLst/>
+          </a:prstGeom>
+          <a:solidFill>
+            <a:srgbClr val="FFFF00"/>
+          </a:solidFill>
+          <a:ln>
+            <a:solidFill>
+              <a:schemeClr val="tx1"/>
+            </a:solidFill>
+          </a:ln>
+        </p:spPr>
+        <p:style>
+          <a:lnRef idx="2">
+            <a:schemeClr val="accent1">
+              <a:shade val="50000"/>
+            </a:schemeClr>
+          </a:lnRef>
+          <a:fillRef idx="1">
+            <a:schemeClr val="accent1"/>
+          </a:fillRef>
+          <a:effectRef idx="0">
+            <a:schemeClr val="accent1"/>
+          </a:effectRef>
+          <a:fontRef idx="minor">
+            <a:schemeClr val="lt1"/>
+          </a:fontRef>
+        </p:style>
+        <p:txBody>
+          <a:bodyPr rtlCol="0" anchor="ctr"/>
+          <a:lstStyle/>
+          <a:p>
+            <a:pPr algn="ctr"/>
+            <a:endParaRPr lang="pt-BR"/>
+          </a:p>
+        </p:txBody>
+      </p:sp>
+      <p:sp>
+        <p:nvSpPr>
+          <p:cNvPr id="27" name="Fluxograma: Conector 26"/>
+          <p:cNvSpPr/>
+          <p:nvPr/>
+        </p:nvSpPr>
+        <p:spPr>
+          <a:xfrm>
+            <a:off x="11678727" y="4915107"/>
+            <a:ext cx="257578" cy="257578"/>
+          </a:xfrm>
+          <a:prstGeom prst="flowChartConnector">
+            <a:avLst/>
+          </a:prstGeom>
+          <a:solidFill>
+            <a:srgbClr val="FFFF00"/>
+          </a:solidFill>
+          <a:ln>
+            <a:solidFill>
+              <a:schemeClr val="tx1"/>
+            </a:solidFill>
+          </a:ln>
+        </p:spPr>
+        <p:style>
+          <a:lnRef idx="2">
+            <a:schemeClr val="accent1">
+              <a:shade val="50000"/>
+            </a:schemeClr>
+          </a:lnRef>
+          <a:fillRef idx="1">
+            <a:schemeClr val="accent1"/>
+          </a:fillRef>
+          <a:effectRef idx="0">
+            <a:schemeClr val="accent1"/>
+          </a:effectRef>
+          <a:fontRef idx="minor">
+            <a:schemeClr val="lt1"/>
+          </a:fontRef>
+        </p:style>
+        <p:txBody>
+          <a:bodyPr rtlCol="0" anchor="ctr"/>
+          <a:lstStyle/>
+          <a:p>
+            <a:pPr algn="ctr"/>
+            <a:endParaRPr lang="pt-BR"/>
+          </a:p>
+        </p:txBody>
+      </p:sp>
+      <p:sp>
+        <p:nvSpPr>
+          <p:cNvPr id="28" name="Fluxograma: Conector 27"/>
+          <p:cNvSpPr/>
+          <p:nvPr/>
+        </p:nvSpPr>
+        <p:spPr>
+          <a:xfrm>
+            <a:off x="11673935" y="5472812"/>
+            <a:ext cx="257578" cy="257578"/>
+          </a:xfrm>
+          <a:prstGeom prst="flowChartConnector">
+            <a:avLst/>
+          </a:prstGeom>
+          <a:solidFill>
+            <a:srgbClr val="FFFF00"/>
+          </a:solidFill>
+          <a:ln>
+            <a:solidFill>
+              <a:schemeClr val="tx1"/>
+            </a:solidFill>
+          </a:ln>
+        </p:spPr>
+        <p:style>
+          <a:lnRef idx="2">
+            <a:schemeClr val="accent1">
+              <a:shade val="50000"/>
+            </a:schemeClr>
+          </a:lnRef>
+          <a:fillRef idx="1">
+            <a:schemeClr val="accent1"/>
+          </a:fillRef>
+          <a:effectRef idx="0">
+            <a:schemeClr val="accent1"/>
+          </a:effectRef>
+          <a:fontRef idx="minor">
+            <a:schemeClr val="lt1"/>
+          </a:fontRef>
+        </p:style>
+        <p:txBody>
+          <a:bodyPr rtlCol="0" anchor="ctr"/>
+          <a:lstStyle/>
+          <a:p>
+            <a:pPr algn="ctr"/>
+            <a:endParaRPr lang="pt-BR"/>
+          </a:p>
+        </p:txBody>
+      </p:sp>
+      <p:sp>
+        <p:nvSpPr>
+          <p:cNvPr id="34" name="Fluxograma: Conector 33"/>
+          <p:cNvSpPr/>
+          <p:nvPr/>
+        </p:nvSpPr>
+        <p:spPr>
+          <a:xfrm>
+            <a:off x="11673935" y="5989429"/>
+            <a:ext cx="257578" cy="257578"/>
+          </a:xfrm>
+          <a:prstGeom prst="flowChartConnector">
+            <a:avLst/>
+          </a:prstGeom>
+          <a:solidFill>
+            <a:srgbClr val="FFFF00"/>
+          </a:solidFill>
+          <a:ln>
+            <a:solidFill>
+              <a:schemeClr val="tx1"/>
+            </a:solidFill>
+          </a:ln>
+        </p:spPr>
+        <p:style>
+          <a:lnRef idx="2">
+            <a:schemeClr val="accent1">
+              <a:shade val="50000"/>
+            </a:schemeClr>
+          </a:lnRef>
+          <a:fillRef idx="1">
+            <a:schemeClr val="accent1"/>
+          </a:fillRef>
+          <a:effectRef idx="0">
+            <a:schemeClr val="accent1"/>
+          </a:effectRef>
+          <a:fontRef idx="minor">
+            <a:schemeClr val="lt1"/>
+          </a:fontRef>
+        </p:style>
+        <p:txBody>
+          <a:bodyPr rtlCol="0" anchor="ctr"/>
+          <a:lstStyle/>
+          <a:p>
+            <a:pPr algn="ctr"/>
+            <a:endParaRPr lang="pt-BR"/>
+          </a:p>
+        </p:txBody>
+      </p:sp>
+    </p:spTree>
+    <p:extLst>
+      <p:ext uri="{BB962C8B-B14F-4D97-AF65-F5344CB8AC3E}">
+        <p14:creationId xmlns:p14="http://schemas.microsoft.com/office/powerpoint/2010/main" val="2668113434"/>
+      </p:ext>
+    </p:extLst>
+  </p:cSld>
+  <p:clrMapOvr>
+    <a:masterClrMapping/>
+  </p:clrMapOvr>
+  <p:timing>
+    <p:tnLst>
+      <p:par>
+        <p:cTn id="1" dur="indefinite" restart="never" nodeType="tmRoot"/>
+      </p:par>
+    </p:tnLst>
+  </p:timing>
+</p:sld>
+</file>
+
+<file path=ppt/slides/slide44.xml><?xml version="1.0" encoding="utf-8"?>
+<p:sld xmlns:a="http://schemas.openxmlformats.org/drawingml/2006/main" xmlns:r="http://schemas.openxmlformats.org/officeDocument/2006/relationships" xmlns:p="http://schemas.openxmlformats.org/presentationml/2006/main">
+  <p:cSld>
+    <p:spTree>
+      <p:nvGrpSpPr>
+        <p:cNvPr id="1" name=""/>
+        <p:cNvGrpSpPr/>
+        <p:nvPr/>
+      </p:nvGrpSpPr>
+      <p:grpSpPr>
+        <a:xfrm>
+          <a:off x="0" y="0"/>
+          <a:ext cx="0" cy="0"/>
+          <a:chOff x="0" y="0"/>
+          <a:chExt cx="0" cy="0"/>
+        </a:xfrm>
+      </p:grpSpPr>
+      <p:sp>
+        <p:nvSpPr>
+          <p:cNvPr id="2" name="Título 1"/>
+          <p:cNvSpPr>
+            <a:spLocks noGrp="1"/>
+          </p:cNvSpPr>
+          <p:nvPr>
+            <p:ph type="title"/>
+          </p:nvPr>
+        </p:nvSpPr>
+        <p:spPr>
+          <a:xfrm>
+            <a:off x="818712" y="138095"/>
+            <a:ext cx="8634381" cy="970450"/>
+          </a:xfrm>
+        </p:spPr>
+        <p:txBody>
+          <a:bodyPr/>
+          <a:lstStyle/>
+          <a:p>
+            <a:r>
+              <a:rPr lang="pt-BR" dirty="0" smtClean="0"/>
+              <a:t>Referências</a:t>
+            </a:r>
+            <a:endParaRPr lang="pt-BR" dirty="0"/>
+          </a:p>
+        </p:txBody>
+      </p:sp>
+      <p:sp>
+        <p:nvSpPr>
+          <p:cNvPr id="3" name="Espaço Reservado para Conteúdo 2"/>
+          <p:cNvSpPr>
+            <a:spLocks noGrp="1"/>
+          </p:cNvSpPr>
+          <p:nvPr>
+            <p:ph idx="1"/>
+          </p:nvPr>
+        </p:nvSpPr>
+        <p:spPr>
+          <a:xfrm>
+            <a:off x="838200" y="1883613"/>
+            <a:ext cx="10515600" cy="4351338"/>
+          </a:xfrm>
+        </p:spPr>
+        <p:txBody>
+          <a:bodyPr/>
+          <a:lstStyle/>
+          <a:p>
+            <a:r>
+              <a:rPr lang="pt-BR" dirty="0" smtClean="0"/>
+              <a:t>W3schools Treinamento e desenvolvimento web. Disponível em &lt;http</a:t>
+            </a:r>
+            <a:r>
+              <a:rPr lang="pt-BR" dirty="0"/>
+              <a:t>://www.w3schools.com</a:t>
+            </a:r>
+            <a:r>
+              <a:rPr lang="pt-BR" dirty="0" smtClean="0"/>
+              <a:t>/&gt; Acesso em: 10 Abr. 2016</a:t>
+            </a:r>
+          </a:p>
+          <a:p>
+            <a:endParaRPr lang="pt-BR" dirty="0" smtClean="0"/>
+          </a:p>
+          <a:p>
+            <a:r>
+              <a:rPr lang="pt-BR" dirty="0" smtClean="0"/>
+              <a:t>Mozilla </a:t>
+            </a:r>
+            <a:r>
+              <a:rPr lang="pt-BR" dirty="0" err="1" smtClean="0"/>
+              <a:t>Developer</a:t>
+            </a:r>
+            <a:r>
+              <a:rPr lang="pt-BR" dirty="0" smtClean="0"/>
+              <a:t> Network. Disponível em: &lt;https</a:t>
+            </a:r>
+            <a:r>
+              <a:rPr lang="pt-BR" dirty="0"/>
+              <a:t>://developer.mozilla.org/pt-BR</a:t>
+            </a:r>
+            <a:r>
+              <a:rPr lang="pt-BR" dirty="0" smtClean="0"/>
+              <a:t>/&gt; Acesso em: 10. Abr. 2016</a:t>
+            </a:r>
+          </a:p>
+          <a:p>
+            <a:endParaRPr lang="pt-BR" dirty="0"/>
+          </a:p>
+          <a:p>
+            <a:r>
+              <a:rPr lang="pt-BR" dirty="0" err="1" smtClean="0"/>
+              <a:t>Caelum</a:t>
+            </a:r>
+            <a:r>
+              <a:rPr lang="pt-BR" dirty="0" smtClean="0"/>
+              <a:t> Ensino e Inovação. Desenvolvimento Web com HTML, CSS e </a:t>
+            </a:r>
+            <a:r>
+              <a:rPr lang="pt-BR" dirty="0" err="1" smtClean="0"/>
+              <a:t>JavaScript</a:t>
+            </a:r>
+            <a:r>
+              <a:rPr lang="pt-BR" dirty="0" smtClean="0"/>
+              <a:t>. Curso WD-43.</a:t>
+            </a:r>
+          </a:p>
+          <a:p>
+            <a:endParaRPr lang="pt-BR" dirty="0"/>
+          </a:p>
+        </p:txBody>
+      </p:sp>
+      <p:pic>
+        <p:nvPicPr>
+          <p:cNvPr id="5" name="Espaço Reservado para Conteúdo 3"/>
+          <p:cNvPicPr>
+            <a:picLocks noChangeAspect="1"/>
+          </p:cNvPicPr>
+          <p:nvPr/>
+        </p:nvPicPr>
+        <p:blipFill>
+          <a:blip r:embed="rId2">
+            <a:extLst>
+              <a:ext uri="{28A0092B-C50C-407E-A947-70E740481C1C}">
+                <a14:useLocalDpi xmlns:a14="http://schemas.microsoft.com/office/drawing/2010/main" val="0"/>
+              </a:ext>
+            </a:extLst>
+          </a:blip>
+          <a:stretch>
+            <a:fillRect/>
+          </a:stretch>
+        </p:blipFill>
+        <p:spPr>
+          <a:xfrm>
+            <a:off x="818712" y="1139143"/>
+            <a:ext cx="11373288" cy="695325"/>
+          </a:xfrm>
+          <a:prstGeom prst="rect">
+            <a:avLst/>
+          </a:prstGeom>
+        </p:spPr>
+      </p:pic>
+      <p:pic>
+        <p:nvPicPr>
+          <p:cNvPr id="7" name="Espaço Reservado para Conteúdo 5"/>
+          <p:cNvPicPr>
+            <a:picLocks noChangeAspect="1"/>
+          </p:cNvPicPr>
+          <p:nvPr/>
+        </p:nvPicPr>
+        <p:blipFill>
+          <a:blip r:embed="rId3" cstate="print">
+            <a:extLst>
+              <a:ext uri="{28A0092B-C50C-407E-A947-70E740481C1C}">
+                <a14:useLocalDpi xmlns:a14="http://schemas.microsoft.com/office/drawing/2010/main" val="0"/>
+              </a:ext>
+            </a:extLst>
+          </a:blip>
+          <a:stretch>
+            <a:fillRect/>
+          </a:stretch>
+        </p:blipFill>
+        <p:spPr>
+          <a:xfrm>
+            <a:off x="10097037" y="219459"/>
+            <a:ext cx="1953555" cy="669183"/>
+          </a:xfrm>
+          <a:prstGeom prst="rect">
+            <a:avLst/>
+          </a:prstGeom>
+        </p:spPr>
+      </p:pic>
+      <p:pic>
+        <p:nvPicPr>
+          <p:cNvPr id="9" name="Espaço Reservado para Conteúdo 7"/>
+          <p:cNvPicPr>
+            <a:picLocks noChangeAspect="1"/>
+          </p:cNvPicPr>
+          <p:nvPr/>
+        </p:nvPicPr>
+        <p:blipFill>
+          <a:blip r:embed="rId4">
+            <a:extLst>
+              <a:ext uri="{28A0092B-C50C-407E-A947-70E740481C1C}">
+                <a14:useLocalDpi xmlns:a14="http://schemas.microsoft.com/office/drawing/2010/main" val="0"/>
+              </a:ext>
+            </a:extLst>
+          </a:blip>
+          <a:stretch>
+            <a:fillRect/>
+          </a:stretch>
+        </p:blipFill>
+        <p:spPr>
+          <a:xfrm>
+            <a:off x="11308648" y="6370179"/>
+            <a:ext cx="883352" cy="487821"/>
+          </a:xfrm>
+          <a:prstGeom prst="rect">
+            <a:avLst/>
+          </a:prstGeom>
+        </p:spPr>
+      </p:pic>
+      <p:sp>
+        <p:nvSpPr>
+          <p:cNvPr id="8" name="CaixaDeTexto 7"/>
+          <p:cNvSpPr txBox="1"/>
+          <p:nvPr/>
+        </p:nvSpPr>
+        <p:spPr>
+          <a:xfrm>
+            <a:off x="11331224" y="6429423"/>
+            <a:ext cx="838200" cy="369332"/>
+          </a:xfrm>
+          <a:prstGeom prst="rect">
+            <a:avLst/>
+          </a:prstGeom>
+          <a:noFill/>
+        </p:spPr>
+        <p:txBody>
+          <a:bodyPr wrap="square" rtlCol="0">
+            <a:spAutoFit/>
+          </a:bodyPr>
+          <a:lstStyle/>
+          <a:p>
+            <a:pPr algn="ctr"/>
+            <a:r>
+              <a:rPr lang="pt-BR" dirty="0" smtClean="0"/>
+              <a:t>42</a:t>
+            </a:r>
+            <a:endParaRPr lang="pt-BR" dirty="0" smtClean="0"/>
           </a:p>
         </p:txBody>
       </p:sp>

</xml_diff>